<commit_message>
Atualização da apresentação para o SBGames
</commit_message>
<xml_diff>
--- a/docs/Apresentação/SDM - Apresentação SBGames.pptx
+++ b/docs/Apresentação/SDM - Apresentação SBGames.pptx
@@ -5,16 +5,16 @@
     <p:sldMasterId id="2147483648" r:id="rId1"/>
   </p:sldMasterIdLst>
   <p:notesMasterIdLst>
-    <p:notesMasterId r:id="rId18"/>
+    <p:notesMasterId r:id="rId24"/>
   </p:notesMasterIdLst>
   <p:sldIdLst>
     <p:sldId id="256" r:id="rId2"/>
     <p:sldId id="270" r:id="rId3"/>
     <p:sldId id="278" r:id="rId4"/>
     <p:sldId id="269" r:id="rId5"/>
-    <p:sldId id="267" r:id="rId6"/>
-    <p:sldId id="264" r:id="rId7"/>
-    <p:sldId id="271" r:id="rId8"/>
+    <p:sldId id="283" r:id="rId6"/>
+    <p:sldId id="289" r:id="rId7"/>
+    <p:sldId id="264" r:id="rId8"/>
     <p:sldId id="272" r:id="rId9"/>
     <p:sldId id="279" r:id="rId10"/>
     <p:sldId id="273" r:id="rId11"/>
@@ -23,7 +23,13 @@
     <p:sldId id="266" r:id="rId14"/>
     <p:sldId id="276" r:id="rId15"/>
     <p:sldId id="268" r:id="rId16"/>
-    <p:sldId id="275" r:id="rId17"/>
+    <p:sldId id="280" r:id="rId17"/>
+    <p:sldId id="275" r:id="rId18"/>
+    <p:sldId id="285" r:id="rId19"/>
+    <p:sldId id="282" r:id="rId20"/>
+    <p:sldId id="287" r:id="rId21"/>
+    <p:sldId id="286" r:id="rId22"/>
+    <p:sldId id="288" r:id="rId23"/>
   </p:sldIdLst>
   <p:sldSz cx="9144000" cy="6858000" type="screen4x3"/>
   <p:notesSz cx="6858000" cy="9144000"/>
@@ -208,7 +214,7 @@
             <a:fld id="{451EA883-6A43-4C6F-99C1-D5EA532ECC09}" type="datetimeFigureOut">
               <a:rPr lang="pt-BR" smtClean="0"/>
               <a:pPr/>
-              <a:t>19/10/2011</a:t>
+              <a:t>31/10/2011</a:t>
             </a:fld>
             <a:endParaRPr lang="pt-BR"/>
           </a:p>
@@ -642,43 +648,27 @@
           <a:p>
             <a:r>
               <a:rPr lang="pt-BR" dirty="0" smtClean="0"/>
-              <a:t>Além</a:t>
+              <a:t>No</a:t>
             </a:r>
             <a:r>
               <a:rPr lang="pt-BR" baseline="0" dirty="0" smtClean="0"/>
-              <a:t> dos atributos, os </a:t>
+              <a:t> SDM é permitido fazer modificações na equipe do jogador </a:t>
             </a:r>
             <a:r>
               <a:rPr lang="pt-BR" baseline="0" dirty="0" err="1" smtClean="0"/>
-              <a:t>funcionarios</a:t>
+              <a:t>atravez</a:t>
             </a:r>
             <a:r>
               <a:rPr lang="pt-BR" baseline="0" dirty="0" smtClean="0"/>
-              <a:t> possuem especializações. Estas </a:t>
+              <a:t> de contratações e demissões. As </a:t>
             </a:r>
             <a:r>
               <a:rPr lang="pt-BR" baseline="0" dirty="0" err="1" smtClean="0"/>
-              <a:t>especializacoes</a:t>
+              <a:t>demissoes</a:t>
             </a:r>
             <a:r>
               <a:rPr lang="pt-BR" baseline="0" dirty="0" smtClean="0"/>
-              <a:t> podem ser de 3 tipos: ferramentas, que são </a:t>
-            </a:r>
-            <a:r>
-              <a:rPr lang="pt-BR" baseline="0" dirty="0" err="1" smtClean="0"/>
-              <a:t>utilziadas</a:t>
-            </a:r>
-            <a:r>
-              <a:rPr lang="pt-BR" baseline="0" dirty="0" smtClean="0"/>
-              <a:t> para </a:t>
-            </a:r>
-            <a:r>
-              <a:rPr lang="pt-BR" baseline="0" dirty="0" err="1" smtClean="0"/>
-              <a:t>auxilar</a:t>
-            </a:r>
-            <a:r>
-              <a:rPr lang="pt-BR" baseline="0" dirty="0" smtClean="0"/>
-              <a:t> o </a:t>
+              <a:t> podem ser pelo jogador ou pela insatisfação do </a:t>
             </a:r>
             <a:r>
               <a:rPr lang="pt-BR" baseline="0" dirty="0" err="1" smtClean="0"/>
@@ -686,15 +676,61 @@
             </a:r>
             <a:r>
               <a:rPr lang="pt-BR" baseline="0" dirty="0" smtClean="0"/>
-              <a:t>; de linguagem de programação e metodologia que são utilizados para avaliar o desempenho do </a:t>
+              <a:t>. A tela de contratação exibida nesta figura mostra a lista de </a:t>
             </a:r>
             <a:r>
               <a:rPr lang="pt-BR" baseline="0" dirty="0" err="1" smtClean="0"/>
-              <a:t>funcionario</a:t>
+              <a:t>possiveis</a:t>
             </a:r>
             <a:r>
               <a:rPr lang="pt-BR" baseline="0" dirty="0" smtClean="0"/>
-              <a:t>.</a:t>
+              <a:t> candidatos, que caso algum seja selecionado uma janela com as </a:t>
+            </a:r>
+            <a:r>
+              <a:rPr lang="pt-BR" baseline="0" dirty="0" err="1" smtClean="0"/>
+              <a:t>caracteristas</a:t>
+            </a:r>
+            <a:r>
+              <a:rPr lang="pt-BR" baseline="0" dirty="0" smtClean="0"/>
+              <a:t> dele será exibida. E do outro lado a equipe do jogador, onde deve escolher qual “</a:t>
+            </a:r>
+            <a:r>
+              <a:rPr lang="pt-BR" baseline="0" dirty="0" err="1" smtClean="0"/>
+              <a:t>slot</a:t>
+            </a:r>
+            <a:r>
+              <a:rPr lang="pt-BR" baseline="0" dirty="0" smtClean="0"/>
+              <a:t>” o novo candidato vai ocupar.</a:t>
+            </a:r>
+          </a:p>
+          <a:p>
+            <a:r>
+              <a:rPr lang="pt-BR" baseline="0" dirty="0" smtClean="0"/>
+              <a:t>Alem da contratação, ao decorrer no desenvolvimento do produto é </a:t>
+            </a:r>
+            <a:r>
+              <a:rPr lang="pt-BR" baseline="0" dirty="0" err="1" smtClean="0"/>
+              <a:t>possivel</a:t>
+            </a:r>
+            <a:r>
+              <a:rPr lang="pt-BR" baseline="0" dirty="0" smtClean="0"/>
+              <a:t> negociar com o cliente para alterar algumas </a:t>
+            </a:r>
+            <a:r>
+              <a:rPr lang="pt-BR" baseline="0" dirty="0" err="1" smtClean="0"/>
+              <a:t>caracteriscas</a:t>
+            </a:r>
+            <a:r>
+              <a:rPr lang="pt-BR" baseline="0" dirty="0" smtClean="0"/>
+              <a:t> do contrato, como ilustrado por esta figura e criar </a:t>
+            </a:r>
+            <a:r>
+              <a:rPr lang="pt-BR" baseline="0" dirty="0" err="1" smtClean="0"/>
+              <a:t>prototipos</a:t>
+            </a:r>
+            <a:r>
+              <a:rPr lang="pt-BR" baseline="0" dirty="0" smtClean="0"/>
+              <a:t> para o cliente com o intuito de aumentar a validação do modelo.</a:t>
             </a:r>
             <a:endParaRPr lang="pt-BR" dirty="0"/>
           </a:p>
@@ -718,7 +754,7 @@
             <a:fld id="{C08094CF-D84A-4161-9F88-9244F515EB29}" type="slidenum">
               <a:rPr lang="pt-BR" smtClean="0"/>
               <a:pPr/>
-              <a:t>10</a:t>
+              <a:t>12</a:t>
             </a:fld>
             <a:endParaRPr lang="pt-BR"/>
           </a:p>
@@ -780,80 +816,29 @@
           <a:p>
             <a:r>
               <a:rPr lang="pt-BR" dirty="0" smtClean="0"/>
-              <a:t>Caso</a:t>
+              <a:t>O Diferencial do SDM em relação aos</a:t>
             </a:r>
             <a:r>
               <a:rPr lang="pt-BR" baseline="0" dirty="0" smtClean="0"/>
-              <a:t> um </a:t>
+              <a:t> demais jogos citados é de ter foco em </a:t>
             </a:r>
             <a:r>
               <a:rPr lang="pt-BR" baseline="0" dirty="0" err="1" smtClean="0"/>
-              <a:t>funcionario</a:t>
+              <a:t>gestao</a:t>
             </a:r>
             <a:r>
               <a:rPr lang="pt-BR" baseline="0" dirty="0" smtClean="0"/>
-              <a:t> não possua uma especialização, é </a:t>
+              <a:t> de pessoas, </a:t>
             </a:r>
             <a:r>
               <a:rPr lang="pt-BR" baseline="0" dirty="0" err="1" smtClean="0"/>
-              <a:t>possivel</a:t>
+              <a:t>consequentimente</a:t>
             </a:r>
             <a:r>
               <a:rPr lang="pt-BR" baseline="0" dirty="0" smtClean="0"/>
-              <a:t> </a:t>
-            </a:r>
-            <a:r>
-              <a:rPr lang="pt-BR" baseline="0" dirty="0" err="1" smtClean="0"/>
-              <a:t>coloca-lo</a:t>
-            </a:r>
-            <a:r>
-              <a:rPr lang="pt-BR" baseline="0" dirty="0" smtClean="0"/>
-              <a:t> em treinamento para adquiri-la.</a:t>
-            </a:r>
-          </a:p>
-          <a:p>
-            <a:r>
-              <a:rPr lang="pt-BR" baseline="0" dirty="0" smtClean="0"/>
-              <a:t>Um outro aspecto do SDM é a relação de horas de trabalho, moral e estamina. As horas de trabalho é utilizada para afetar a negativamente a estamina caso trabalhe mais que 40 horas semanais e positivamente </a:t>
-            </a:r>
-            <a:r>
-              <a:rPr lang="pt-BR" baseline="0" dirty="0" err="1" smtClean="0"/>
-              <a:t>quaso</a:t>
-            </a:r>
-            <a:r>
-              <a:rPr lang="pt-BR" baseline="0" dirty="0" smtClean="0"/>
-              <a:t> trabalhe menos. O moral é afetado por promoções, </a:t>
-            </a:r>
-            <a:r>
-              <a:rPr lang="pt-BR" baseline="0" dirty="0" err="1" smtClean="0"/>
-              <a:t>conclusao</a:t>
-            </a:r>
-            <a:r>
-              <a:rPr lang="pt-BR" baseline="0" dirty="0" smtClean="0"/>
-              <a:t> de projetos e falta de pagamento. O moral em conjunto com a estamina são utilizados para calcular o rendimento do </a:t>
-            </a:r>
-            <a:r>
-              <a:rPr lang="pt-BR" baseline="0" dirty="0" err="1" smtClean="0"/>
-              <a:t>funcionario</a:t>
-            </a:r>
-            <a:r>
-              <a:rPr lang="pt-BR" baseline="0" dirty="0" smtClean="0"/>
-              <a:t>.</a:t>
-            </a:r>
-          </a:p>
-          <a:p>
-            <a:r>
-              <a:rPr lang="pt-BR" baseline="0" dirty="0" smtClean="0"/>
-              <a:t>No exemplo desta figura, é mostrado o ganho de estamina dos </a:t>
-            </a:r>
-            <a:r>
-              <a:rPr lang="pt-BR" baseline="0" dirty="0" err="1" smtClean="0"/>
-              <a:t>funcionarios</a:t>
-            </a:r>
-            <a:r>
-              <a:rPr lang="pt-BR" baseline="0" dirty="0" smtClean="0"/>
-              <a:t> por estarem trabalhando menos horas.</a:t>
-            </a:r>
+              <a:t> em recursos humanos. Ter a passagem de tempo em tempo real, mas permitindo o jogador a pausar o jogo a qualquer momento. E ser desenvolvido em um ambiente totalmente 3D.</a:t>
+            </a:r>
+            <a:endParaRPr lang="pt-BR" dirty="0"/>
           </a:p>
         </p:txBody>
       </p:sp>
@@ -875,7 +860,7 @@
             <a:fld id="{C08094CF-D84A-4161-9F88-9244F515EB29}" type="slidenum">
               <a:rPr lang="pt-BR" smtClean="0"/>
               <a:pPr/>
-              <a:t>11</a:t>
+              <a:t>13</a:t>
             </a:fld>
             <a:endParaRPr lang="pt-BR"/>
           </a:p>
@@ -937,89 +922,48 @@
           <a:p>
             <a:r>
               <a:rPr lang="pt-BR" dirty="0" smtClean="0"/>
-              <a:t>No</a:t>
+              <a:t>Depois</a:t>
             </a:r>
             <a:r>
               <a:rPr lang="pt-BR" baseline="0" dirty="0" smtClean="0"/>
-              <a:t> SDM é permitido fazer modificações na equipe do jogador </a:t>
+              <a:t> que saiu a primeira </a:t>
             </a:r>
             <a:r>
               <a:rPr lang="pt-BR" baseline="0" dirty="0" err="1" smtClean="0"/>
-              <a:t>atravez</a:t>
+              <a:t>versao</a:t>
             </a:r>
             <a:r>
               <a:rPr lang="pt-BR" baseline="0" dirty="0" smtClean="0"/>
-              <a:t> de contratações e demissões. As </a:t>
+              <a:t> do SDM, foi feita uma </a:t>
             </a:r>
             <a:r>
               <a:rPr lang="pt-BR" baseline="0" dirty="0" err="1" smtClean="0"/>
-              <a:t>demissoes</a:t>
+              <a:t>avaliacao</a:t>
             </a:r>
             <a:r>
               <a:rPr lang="pt-BR" baseline="0" dirty="0" smtClean="0"/>
-              <a:t> podem ser pelo jogador ou pela insatisfação do </a:t>
+              <a:t> com alguns </a:t>
             </a:r>
             <a:r>
               <a:rPr lang="pt-BR" baseline="0" dirty="0" err="1" smtClean="0"/>
-              <a:t>funcionario</a:t>
+              <a:t>voluntarios</a:t>
             </a:r>
             <a:r>
               <a:rPr lang="pt-BR" baseline="0" dirty="0" smtClean="0"/>
-              <a:t>. A tela de contratação exibida nesta figura mostra a lista de </a:t>
-            </a:r>
-            <a:r>
-              <a:rPr lang="pt-BR" baseline="0" dirty="0" err="1" smtClean="0"/>
-              <a:t>possiveis</a:t>
+              <a:t> sobre o que eles acham do SDM</a:t>
             </a:r>
             <a:r>
               <a:rPr lang="pt-BR" baseline="0" dirty="0" smtClean="0"/>
-              <a:t> candidatos, que caso algum seja selecionado uma janela com as </a:t>
-            </a:r>
-            <a:r>
-              <a:rPr lang="pt-BR" baseline="0" dirty="0" err="1" smtClean="0"/>
-              <a:t>caracteristas</a:t>
-            </a:r>
+              <a:t>.</a:t>
+            </a:r>
+          </a:p>
+          <a:p>
+            <a:endParaRPr lang="pt-BR" baseline="0" dirty="0" smtClean="0"/>
+          </a:p>
+          <a:p>
             <a:r>
               <a:rPr lang="pt-BR" baseline="0" dirty="0" smtClean="0"/>
-              <a:t> dele será exibida. E do outro lado a equipe do jogador, onde deve escolher qual “</a:t>
-            </a:r>
-            <a:r>
-              <a:rPr lang="pt-BR" baseline="0" dirty="0" err="1" smtClean="0"/>
-              <a:t>slot</a:t>
-            </a:r>
-            <a:r>
-              <a:rPr lang="pt-BR" baseline="0" dirty="0" smtClean="0"/>
-              <a:t>” o novo candidato vai ocupar.</a:t>
-            </a:r>
-          </a:p>
-          <a:p>
-            <a:r>
-              <a:rPr lang="pt-BR" baseline="0" dirty="0" smtClean="0"/>
-              <a:t>Alem da contratação, ao decorrer no desenvolvimento do produto é </a:t>
-            </a:r>
-            <a:r>
-              <a:rPr lang="pt-BR" baseline="0" dirty="0" err="1" smtClean="0"/>
-              <a:t>possivel</a:t>
-            </a:r>
-            <a:r>
-              <a:rPr lang="pt-BR" baseline="0" dirty="0" smtClean="0"/>
-              <a:t> negociar com o cliente para alterar algumas </a:t>
-            </a:r>
-            <a:r>
-              <a:rPr lang="pt-BR" baseline="0" dirty="0" err="1" smtClean="0"/>
-              <a:t>caracteriscas</a:t>
-            </a:r>
-            <a:r>
-              <a:rPr lang="pt-BR" baseline="0" dirty="0" smtClean="0"/>
-              <a:t> do contrato, como ilustrado por esta figura e criar </a:t>
-            </a:r>
-            <a:r>
-              <a:rPr lang="pt-BR" baseline="0" dirty="0" err="1" smtClean="0"/>
-              <a:t>prototipos</a:t>
-            </a:r>
-            <a:r>
-              <a:rPr lang="pt-BR" baseline="0" dirty="0" smtClean="0"/>
-              <a:t> para o cliente com o intuito de aumentar a validação do modelo.</a:t>
+              <a:t>Falar dos resultados de obtidos, especificamente o publico e se aprendeu algo novo</a:t>
             </a:r>
             <a:endParaRPr lang="pt-BR" dirty="0"/>
           </a:p>
@@ -1043,7 +987,7 @@
             <a:fld id="{C08094CF-D84A-4161-9F88-9244F515EB29}" type="slidenum">
               <a:rPr lang="pt-BR" smtClean="0"/>
               <a:pPr/>
-              <a:t>12</a:t>
+              <a:t>14</a:t>
             </a:fld>
             <a:endParaRPr lang="pt-BR"/>
           </a:p>
@@ -1105,29 +1049,64 @@
           <a:p>
             <a:r>
               <a:rPr lang="pt-BR" dirty="0" smtClean="0"/>
-              <a:t>O Diferencial do SDM em relação aos</a:t>
+              <a:t>O SDM tem como finalidade</a:t>
             </a:r>
             <a:r>
               <a:rPr lang="pt-BR" baseline="0" dirty="0" smtClean="0"/>
-              <a:t> demais jogos citados é de ter foco em </a:t>
+              <a:t> em auxiliar no entendimento dos conceitos e ensinar a </a:t>
             </a:r>
             <a:r>
               <a:rPr lang="pt-BR" baseline="0" dirty="0" err="1" smtClean="0"/>
-              <a:t>gestao</a:t>
+              <a:t>importancia</a:t>
             </a:r>
             <a:r>
               <a:rPr lang="pt-BR" baseline="0" dirty="0" smtClean="0"/>
-              <a:t> de pessoas, </a:t>
+              <a:t> dos </a:t>
             </a:r>
             <a:r>
               <a:rPr lang="pt-BR" baseline="0" dirty="0" err="1" smtClean="0"/>
-              <a:t>consequentimente</a:t>
+              <a:t>funcionarios</a:t>
             </a:r>
             <a:r>
               <a:rPr lang="pt-BR" baseline="0" dirty="0" smtClean="0"/>
-              <a:t> em recursos humanos. Ter a passagem de tempo em tempo real, mas permitindo o jogador a pausar o jogo a qualquer momento. E ser desenvolvido em um ambiente totalmente 3D.</a:t>
-            </a:r>
-            <a:endParaRPr lang="pt-BR" dirty="0"/>
+              <a:t> e seus papéis.</a:t>
+            </a:r>
+          </a:p>
+          <a:p>
+            <a:r>
+              <a:rPr lang="pt-BR" baseline="0" dirty="0" smtClean="0"/>
+              <a:t>Na atual versão do jogo, existe algumas limitações, como por exemplo não é </a:t>
+            </a:r>
+            <a:r>
+              <a:rPr lang="pt-BR" baseline="0" dirty="0" err="1" smtClean="0"/>
+              <a:t>possivel</a:t>
+            </a:r>
+            <a:r>
+              <a:rPr lang="pt-BR" baseline="0" dirty="0" smtClean="0"/>
+              <a:t> definir iterações que forneçam resultados de desempenho do </a:t>
+            </a:r>
+            <a:r>
+              <a:rPr lang="pt-BR" baseline="0" dirty="0" err="1" smtClean="0"/>
+              <a:t>periodo</a:t>
+            </a:r>
+            <a:r>
+              <a:rPr lang="pt-BR" baseline="0" dirty="0" smtClean="0"/>
+              <a:t> definido.</a:t>
+            </a:r>
+          </a:p>
+          <a:p>
+            <a:r>
+              <a:rPr lang="pt-BR" baseline="0" dirty="0" smtClean="0"/>
+              <a:t>Futuras modificações que podem ser feitas no SDM é a </a:t>
+            </a:r>
+            <a:r>
+              <a:rPr lang="pt-BR" baseline="0" dirty="0" err="1" smtClean="0"/>
+              <a:t>inclusao</a:t>
+            </a:r>
+            <a:r>
+              <a:rPr lang="pt-BR" baseline="0" dirty="0" smtClean="0"/>
+              <a:t> de iterações e aprofundamento das metodologias de trabalho, que na atual versão só é utilizado para distinção.</a:t>
+            </a:r>
           </a:p>
         </p:txBody>
       </p:sp>
@@ -1149,7 +1128,7 @@
             <a:fld id="{C08094CF-D84A-4161-9F88-9244F515EB29}" type="slidenum">
               <a:rPr lang="pt-BR" smtClean="0"/>
               <a:pPr/>
-              <a:t>13</a:t>
+              <a:t>15</a:t>
             </a:fld>
             <a:endParaRPr lang="pt-BR"/>
           </a:p>
@@ -1211,35 +1190,59 @@
           <a:p>
             <a:r>
               <a:rPr lang="pt-BR" dirty="0" smtClean="0"/>
-              <a:t>Depois</a:t>
+              <a:t>Além dos papéis, os </a:t>
+            </a:r>
+            <a:r>
+              <a:rPr lang="pt-BR" dirty="0" err="1" smtClean="0"/>
+              <a:t>funcionarios</a:t>
+            </a:r>
+            <a:r>
+              <a:rPr lang="pt-BR" dirty="0" smtClean="0"/>
+              <a:t> podem</a:t>
             </a:r>
             <a:r>
               <a:rPr lang="pt-BR" baseline="0" dirty="0" smtClean="0"/>
-              <a:t> que saiu a primeira </a:t>
+              <a:t> desempenhar diferentes cargos na empresa, podendo ser </a:t>
             </a:r>
             <a:r>
               <a:rPr lang="pt-BR" baseline="0" dirty="0" err="1" smtClean="0"/>
-              <a:t>versao</a:t>
+              <a:t>junior</a:t>
             </a:r>
             <a:r>
               <a:rPr lang="pt-BR" baseline="0" dirty="0" smtClean="0"/>
-              <a:t> do SDM, foi feita uma </a:t>
+              <a:t>, pleno ou </a:t>
             </a:r>
             <a:r>
               <a:rPr lang="pt-BR" baseline="0" dirty="0" err="1" smtClean="0"/>
-              <a:t>avaliacao</a:t>
+              <a:t>senior</a:t>
             </a:r>
             <a:r>
               <a:rPr lang="pt-BR" baseline="0" dirty="0" smtClean="0"/>
-              <a:t> com alguns </a:t>
+              <a:t>. Estes cargos são utilizados para modificar o desempenho do </a:t>
             </a:r>
             <a:r>
               <a:rPr lang="pt-BR" baseline="0" dirty="0" err="1" smtClean="0"/>
-              <a:t>voluntarios</a:t>
+              <a:t>funcionario</a:t>
             </a:r>
             <a:r>
               <a:rPr lang="pt-BR" baseline="0" dirty="0" smtClean="0"/>
-              <a:t> sobre o que eles acham do SDM.</a:t>
+              <a:t> e </a:t>
+            </a:r>
+            <a:r>
+              <a:rPr lang="pt-BR" baseline="0" dirty="0" err="1" smtClean="0"/>
+              <a:t>consequentemente</a:t>
+            </a:r>
+            <a:r>
+              <a:rPr lang="pt-BR" baseline="0" dirty="0" smtClean="0"/>
+              <a:t> o </a:t>
+            </a:r>
+            <a:r>
+              <a:rPr lang="pt-BR" baseline="0" dirty="0" err="1" smtClean="0"/>
+              <a:t>salario</a:t>
+            </a:r>
+            <a:r>
+              <a:rPr lang="pt-BR" baseline="0" dirty="0" smtClean="0"/>
+              <a:t>.</a:t>
             </a:r>
             <a:endParaRPr lang="pt-BR" dirty="0"/>
           </a:p>
@@ -1263,7 +1266,7 @@
             <a:fld id="{C08094CF-D84A-4161-9F88-9244F515EB29}" type="slidenum">
               <a:rPr lang="pt-BR" smtClean="0"/>
               <a:pPr/>
-              <a:t>14</a:t>
+              <a:t>18</a:t>
             </a:fld>
             <a:endParaRPr lang="pt-BR"/>
           </a:p>
@@ -1325,19 +1328,11 @@
           <a:p>
             <a:r>
               <a:rPr lang="pt-BR" dirty="0" smtClean="0"/>
-              <a:t>O SDM tem como finalidade</a:t>
+              <a:t>Este diagrama ilustra</a:t>
             </a:r>
             <a:r>
               <a:rPr lang="pt-BR" baseline="0" dirty="0" smtClean="0"/>
-              <a:t> em auxiliar no entendimento dos conceitos e ensinar a </a:t>
-            </a:r>
-            <a:r>
-              <a:rPr lang="pt-BR" baseline="0" dirty="0" err="1" smtClean="0"/>
-              <a:t>importancia</a:t>
-            </a:r>
-            <a:r>
-              <a:rPr lang="pt-BR" baseline="0" dirty="0" smtClean="0"/>
-              <a:t> dos </a:t>
+              <a:t> o SDM, podendo perceber que a gestão de pessoas é um ponto fundamental do SDM. Os </a:t>
             </a:r>
             <a:r>
               <a:rPr lang="pt-BR" baseline="0" dirty="0" err="1" smtClean="0"/>
@@ -1345,44 +1340,17 @@
             </a:r>
             <a:r>
               <a:rPr lang="pt-BR" baseline="0" dirty="0" smtClean="0"/>
-              <a:t> e seus papéis.</a:t>
-            </a:r>
-          </a:p>
-          <a:p>
+              <a:t> possuem atributos, especializações e podem fazer treinamentos para adquirir novas especializações. Além disso existem diversos papéis que um </a:t>
+            </a:r>
+            <a:r>
+              <a:rPr lang="pt-BR" baseline="0" dirty="0" err="1" smtClean="0"/>
+              <a:t>funcionario</a:t>
+            </a:r>
             <a:r>
               <a:rPr lang="pt-BR" baseline="0" dirty="0" smtClean="0"/>
-              <a:t>Na atual versão do jogo, existe algumas limitações, como por exemplo não é </a:t>
-            </a:r>
-            <a:r>
-              <a:rPr lang="pt-BR" baseline="0" dirty="0" err="1" smtClean="0"/>
-              <a:t>possivel</a:t>
-            </a:r>
-            <a:r>
-              <a:rPr lang="pt-BR" baseline="0" dirty="0" smtClean="0"/>
-              <a:t> definir iterações que forneçam resultados de desempenho do </a:t>
-            </a:r>
-            <a:r>
-              <a:rPr lang="pt-BR" baseline="0" dirty="0" err="1" smtClean="0"/>
-              <a:t>periodo</a:t>
-            </a:r>
-            <a:r>
-              <a:rPr lang="pt-BR" baseline="0" dirty="0" smtClean="0"/>
-              <a:t> definido.</a:t>
-            </a:r>
-          </a:p>
-          <a:p>
-            <a:r>
-              <a:rPr lang="pt-BR" baseline="0" dirty="0" smtClean="0"/>
-              <a:t>Futuras modificações que podem ser feitas no SDM é a </a:t>
-            </a:r>
-            <a:r>
-              <a:rPr lang="pt-BR" baseline="0" dirty="0" err="1" smtClean="0"/>
-              <a:t>inclusao</a:t>
-            </a:r>
-            <a:r>
-              <a:rPr lang="pt-BR" baseline="0" dirty="0" smtClean="0"/>
-              <a:t> de iterações e aprofundamento das metodologias de trabalho, que na atual versão só é utilizado para distinção.</a:t>
-            </a:r>
+              <a:t> pode desempenhar.</a:t>
+            </a:r>
+            <a:endParaRPr lang="pt-BR" dirty="0"/>
           </a:p>
         </p:txBody>
       </p:sp>
@@ -1404,7 +1372,7 @@
             <a:fld id="{C08094CF-D84A-4161-9F88-9244F515EB29}" type="slidenum">
               <a:rPr lang="pt-BR" smtClean="0"/>
               <a:pPr/>
-              <a:t>15</a:t>
+              <a:t>21</a:t>
             </a:fld>
             <a:endParaRPr lang="pt-BR"/>
           </a:p>
@@ -3151,11 +3119,11 @@
           <a:p>
             <a:r>
               <a:rPr lang="pt-BR" dirty="0" smtClean="0"/>
-              <a:t>Neste slide é ilustrado</a:t>
+              <a:t>Estes papéis são de 6 tipos:</a:t>
             </a:r>
             <a:r>
               <a:rPr lang="pt-BR" baseline="0" dirty="0" smtClean="0"/>
-              <a:t> a interface do jogo SDM. A parte superior é </a:t>
+              <a:t> Analista, que é </a:t>
             </a:r>
             <a:r>
               <a:rPr lang="pt-BR" baseline="0" dirty="0" err="1" smtClean="0"/>
@@ -3163,55 +3131,39 @@
             </a:r>
             <a:r>
               <a:rPr lang="pt-BR" baseline="0" dirty="0" smtClean="0"/>
-              <a:t> pelo controle da equipe do jogador. O canto esquerdo exibe o resumo de cada </a:t>
+              <a:t> em conversar com o cliente para validar o modelo do software que esta sendo desenvolvido; O </a:t>
             </a:r>
             <a:r>
               <a:rPr lang="pt-BR" baseline="0" dirty="0" err="1" smtClean="0"/>
-              <a:t>funcionario</a:t>
+              <a:t>arquireto</a:t>
             </a:r>
             <a:r>
               <a:rPr lang="pt-BR" baseline="0" dirty="0" smtClean="0"/>
-              <a:t> e das </a:t>
+              <a:t> que cria planos de testes.; O gerente; Marketing que auxilia o analista durante as validações e faz negociações com o cliente; Programador que desenvolve o software e insere </a:t>
             </a:r>
             <a:r>
               <a:rPr lang="pt-BR" baseline="0" dirty="0" err="1" smtClean="0"/>
-              <a:t>dispesas</a:t>
+              <a:t>bugs</a:t>
             </a:r>
             <a:r>
               <a:rPr lang="pt-BR" baseline="0" dirty="0" smtClean="0"/>
-              <a:t> do jogador. Os estados dos </a:t>
+              <a:t>; e o testador que no SDM, é </a:t>
             </a:r>
             <a:r>
               <a:rPr lang="pt-BR" baseline="0" dirty="0" err="1" smtClean="0"/>
-              <a:t>funcionarios</a:t>
+              <a:t>responsavel</a:t>
             </a:r>
             <a:r>
               <a:rPr lang="pt-BR" baseline="0" dirty="0" smtClean="0"/>
-              <a:t> </a:t>
+              <a:t> em remover os </a:t>
             </a:r>
             <a:r>
               <a:rPr lang="pt-BR" baseline="0" dirty="0" err="1" smtClean="0"/>
-              <a:t>tambem</a:t>
+              <a:t>bugs</a:t>
             </a:r>
             <a:r>
               <a:rPr lang="pt-BR" baseline="0" dirty="0" smtClean="0"/>
-              <a:t> são exibidos </a:t>
-            </a:r>
-            <a:r>
-              <a:rPr lang="pt-BR" baseline="0" dirty="0" err="1" smtClean="0"/>
-              <a:t>atraves</a:t>
-            </a:r>
-            <a:r>
-              <a:rPr lang="pt-BR" baseline="0" dirty="0" smtClean="0"/>
-              <a:t> das barras que ficam em cima de cada </a:t>
-            </a:r>
-            <a:r>
-              <a:rPr lang="pt-BR" baseline="0" dirty="0" err="1" smtClean="0"/>
-              <a:t>funcionario</a:t>
-            </a:r>
-            <a:r>
-              <a:rPr lang="pt-BR" baseline="0" dirty="0" smtClean="0"/>
-              <a:t>. Em baixo estão as informações do projeto e o controle de passagem do tempo.</a:t>
+              <a:t> colocados pelo programador.</a:t>
             </a:r>
             <a:endParaRPr lang="pt-BR" dirty="0"/>
           </a:p>
@@ -3235,7 +3187,7 @@
             <a:fld id="{C08094CF-D84A-4161-9F88-9244F515EB29}" type="slidenum">
               <a:rPr lang="pt-BR" smtClean="0"/>
               <a:pPr/>
-              <a:t>5</a:t>
+              <a:t>7</a:t>
             </a:fld>
             <a:endParaRPr lang="pt-BR"/>
           </a:p>
@@ -3297,51 +3249,81 @@
           <a:p>
             <a:r>
               <a:rPr lang="pt-BR" dirty="0" smtClean="0"/>
-              <a:t>Estes papéis são de 6 tipos:</a:t>
+              <a:t>Para os atributos dos </a:t>
+            </a:r>
+            <a:r>
+              <a:rPr lang="pt-BR" dirty="0" err="1" smtClean="0"/>
+              <a:t>funcionarios</a:t>
+            </a:r>
+            <a:r>
+              <a:rPr lang="pt-BR" dirty="0" smtClean="0"/>
+              <a:t>, foi feito um estudo</a:t>
             </a:r>
             <a:r>
               <a:rPr lang="pt-BR" baseline="0" dirty="0" smtClean="0"/>
-              <a:t> Analista, que é </a:t>
+              <a:t> sobre </a:t>
             </a:r>
             <a:r>
               <a:rPr lang="pt-BR" baseline="0" dirty="0" err="1" smtClean="0"/>
-              <a:t>responsavel</a:t>
+              <a:t>possiveis</a:t>
             </a:r>
             <a:r>
               <a:rPr lang="pt-BR" baseline="0" dirty="0" smtClean="0"/>
-              <a:t> em conversar com o cliente para validar o modelo do software que esta sendo desenvolvido; O </a:t>
+              <a:t> </a:t>
             </a:r>
             <a:r>
               <a:rPr lang="pt-BR" baseline="0" dirty="0" err="1" smtClean="0"/>
-              <a:t>arquireto</a:t>
+              <a:t>caracteristicas</a:t>
             </a:r>
             <a:r>
               <a:rPr lang="pt-BR" baseline="0" dirty="0" smtClean="0"/>
-              <a:t> que cria planos de testes.; O gerente; Marketing que auxilia o analista durante as validações e faz negociações com o cliente; Programador que desenvolve o software e insere </a:t>
+              <a:t> de pessoas que desempenham os papeis presentes no SDM.</a:t>
+            </a:r>
+          </a:p>
+          <a:p>
+            <a:r>
+              <a:rPr lang="pt-BR" baseline="0" dirty="0" smtClean="0"/>
+              <a:t>Refinando os resultados encontrados por Santos e Russo, foram escolhidos 9 atributos que representariam o </a:t>
             </a:r>
             <a:r>
               <a:rPr lang="pt-BR" baseline="0" dirty="0" err="1" smtClean="0"/>
-              <a:t>bugs</a:t>
+              <a:t>funcionario</a:t>
             </a:r>
             <a:r>
               <a:rPr lang="pt-BR" baseline="0" dirty="0" smtClean="0"/>
-              <a:t>; e o testador que no SDM, é </a:t>
+              <a:t>. Estes 9 atributos são utilizados para o calculo dos atributos de desempenho, que não são </a:t>
             </a:r>
             <a:r>
               <a:rPr lang="pt-BR" baseline="0" dirty="0" err="1" smtClean="0"/>
-              <a:t>responsavel</a:t>
+              <a:t>visiveis</a:t>
             </a:r>
             <a:r>
               <a:rPr lang="pt-BR" baseline="0" dirty="0" smtClean="0"/>
-              <a:t> em remover os </a:t>
+              <a:t> para o jogador. Como os </a:t>
             </a:r>
             <a:r>
               <a:rPr lang="pt-BR" baseline="0" dirty="0" err="1" smtClean="0"/>
-              <a:t>bugs</a:t>
+              <a:t>unicos</a:t>
             </a:r>
             <a:r>
               <a:rPr lang="pt-BR" baseline="0" dirty="0" smtClean="0"/>
-              <a:t> colocados pelo programador.</a:t>
+              <a:t> atributos exibidos ao jogador são os humanos, cabe ao jogador analisar estes atributos e deduzir qual </a:t>
+            </a:r>
+            <a:r>
+              <a:rPr lang="pt-BR" baseline="0" dirty="0" err="1" smtClean="0"/>
+              <a:t>papél</a:t>
+            </a:r>
+            <a:r>
+              <a:rPr lang="pt-BR" baseline="0" dirty="0" smtClean="0"/>
+              <a:t> é mais adequado para o </a:t>
+            </a:r>
+            <a:r>
+              <a:rPr lang="pt-BR" baseline="0" dirty="0" err="1" smtClean="0"/>
+              <a:t>funcionario</a:t>
+            </a:r>
+            <a:r>
+              <a:rPr lang="pt-BR" baseline="0" dirty="0" smtClean="0"/>
+              <a:t>.</a:t>
             </a:r>
             <a:endParaRPr lang="pt-BR" dirty="0"/>
           </a:p>
@@ -3365,7 +3347,7 @@
             <a:fld id="{C08094CF-D84A-4161-9F88-9244F515EB29}" type="slidenum">
               <a:rPr lang="pt-BR" smtClean="0"/>
               <a:pPr/>
-              <a:t>6</a:t>
+              <a:t>8</a:t>
             </a:fld>
             <a:endParaRPr lang="pt-BR"/>
           </a:p>
@@ -3426,36 +3408,59 @@
           <a:lstStyle/>
           <a:p>
             <a:r>
-              <a:rPr lang="pt-BR" dirty="0" smtClean="0"/>
-              <a:t>Além dos papéis, os </a:t>
-            </a:r>
-            <a:r>
-              <a:rPr lang="pt-BR" dirty="0" err="1" smtClean="0"/>
+              <a:rPr lang="pt-BR" smtClean="0"/>
+              <a:t>Rascunho:</a:t>
+            </a:r>
+          </a:p>
+          <a:p>
+            <a:r>
+              <a:rPr lang="pt-BR" dirty="0" smtClean="0"/>
+              <a:t>No</a:t>
+            </a:r>
+            <a:r>
+              <a:rPr lang="pt-BR" baseline="0" dirty="0" smtClean="0"/>
+              <a:t> SDM tanto os </a:t>
+            </a:r>
+            <a:r>
+              <a:rPr lang="pt-BR" baseline="0" dirty="0" err="1" smtClean="0"/>
               <a:t>funcionarios</a:t>
             </a:r>
             <a:r>
-              <a:rPr lang="pt-BR" dirty="0" smtClean="0"/>
-              <a:t> podem</a:t>
-            </a:r>
-            <a:r>
               <a:rPr lang="pt-BR" baseline="0" dirty="0" smtClean="0"/>
-              <a:t> desempenhar diferentes cargos na empresa, podendo ser </a:t>
+              <a:t> quanto a empresa do jogador podem progredir com o passar do tempo de acordo com o desempenho.</a:t>
+            </a:r>
+          </a:p>
+          <a:p>
+            <a:endParaRPr lang="pt-BR" baseline="0" dirty="0" smtClean="0"/>
+          </a:p>
+          <a:p>
+            <a:r>
+              <a:rPr lang="pt-BR" baseline="0" dirty="0" smtClean="0"/>
+              <a:t>Os </a:t>
             </a:r>
             <a:r>
               <a:rPr lang="pt-BR" baseline="0" dirty="0" err="1" smtClean="0"/>
-              <a:t>junior</a:t>
+              <a:t>funcionarios</a:t>
             </a:r>
             <a:r>
               <a:rPr lang="pt-BR" baseline="0" dirty="0" smtClean="0"/>
-              <a:t>, pleno ou </a:t>
+              <a:t>, quando se termina um projeto, recebem uma quantia de pontos de </a:t>
             </a:r>
             <a:r>
               <a:rPr lang="pt-BR" baseline="0" dirty="0" err="1" smtClean="0"/>
-              <a:t>senior</a:t>
+              <a:t>experiencia</a:t>
             </a:r>
             <a:r>
               <a:rPr lang="pt-BR" baseline="0" dirty="0" smtClean="0"/>
-              <a:t>. Estes cargos são utilizados para modificar o desempenho do </a:t>
+              <a:t> (de acordo com a complexidade do projeto e do resultado final, se concluiu ou não). Quando um verto valor de </a:t>
+            </a:r>
+            <a:r>
+              <a:rPr lang="pt-BR" baseline="0" dirty="0" err="1" smtClean="0"/>
+              <a:t>experiencia</a:t>
+            </a:r>
+            <a:r>
+              <a:rPr lang="pt-BR" baseline="0" dirty="0" smtClean="0"/>
+              <a:t> é alcançado, o </a:t>
             </a:r>
             <a:r>
               <a:rPr lang="pt-BR" baseline="0" dirty="0" err="1" smtClean="0"/>
@@ -3463,23 +3468,64 @@
             </a:r>
             <a:r>
               <a:rPr lang="pt-BR" baseline="0" dirty="0" smtClean="0"/>
-              <a:t> e </a:t>
+              <a:t> adquire um novo </a:t>
             </a:r>
             <a:r>
               <a:rPr lang="pt-BR" baseline="0" dirty="0" err="1" smtClean="0"/>
-              <a:t>consequentemente</a:t>
+              <a:t>level</a:t>
             </a:r>
             <a:r>
               <a:rPr lang="pt-BR" baseline="0" dirty="0" smtClean="0"/>
-              <a:t> o </a:t>
+              <a:t>, ganhando pontos em atributos de acordo com o papel desempenhado. Note que todos os atributos podem ser afetados, já que o desempenho em cada papel é influenciado por todos os atributos, mas com pesos diferentes.</a:t>
+            </a:r>
+          </a:p>
+          <a:p>
+            <a:endParaRPr lang="pt-BR" baseline="0" dirty="0" smtClean="0"/>
+          </a:p>
+          <a:p>
+            <a:r>
+              <a:rPr lang="pt-BR" baseline="0" dirty="0" smtClean="0"/>
+              <a:t>A empresa </a:t>
             </a:r>
             <a:r>
               <a:rPr lang="pt-BR" baseline="0" dirty="0" err="1" smtClean="0"/>
-              <a:t>salario</a:t>
+              <a:t>tambem</a:t>
             </a:r>
             <a:r>
               <a:rPr lang="pt-BR" baseline="0" dirty="0" smtClean="0"/>
-              <a:t>.</a:t>
+              <a:t> ganha </a:t>
+            </a:r>
+            <a:r>
+              <a:rPr lang="pt-BR" baseline="0" dirty="0" err="1" smtClean="0"/>
+              <a:t>experiencia</a:t>
+            </a:r>
+            <a:r>
+              <a:rPr lang="pt-BR" baseline="0" dirty="0" smtClean="0"/>
+              <a:t> na conclusão de projetos, ou perde </a:t>
+            </a:r>
+            <a:r>
+              <a:rPr lang="pt-BR" baseline="0" dirty="0" err="1" smtClean="0"/>
+              <a:t>experiencia</a:t>
+            </a:r>
+            <a:r>
+              <a:rPr lang="pt-BR" baseline="0" dirty="0" smtClean="0"/>
+              <a:t> caso não tenha conseguido concluir. Conforme a empresa sobe de </a:t>
+            </a:r>
+            <a:r>
+              <a:rPr lang="pt-BR" baseline="0" dirty="0" err="1" smtClean="0"/>
+              <a:t>nivel</a:t>
+            </a:r>
+            <a:r>
+              <a:rPr lang="pt-BR" baseline="0" dirty="0" smtClean="0"/>
+              <a:t>, novos projetos (com mais complexidade) estarão </a:t>
+            </a:r>
+            <a:r>
+              <a:rPr lang="pt-BR" baseline="0" dirty="0" err="1" smtClean="0"/>
+              <a:t>disponiveis</a:t>
+            </a:r>
+            <a:r>
+              <a:rPr lang="pt-BR" baseline="0" dirty="0" smtClean="0"/>
+              <a:t> para o jogador, onde estes são mais desafiadores, mas fornecem mais recursos para possibilitar uma equipe de desenvolvimento maior.</a:t>
             </a:r>
             <a:endParaRPr lang="pt-BR" dirty="0"/>
           </a:p>
@@ -3503,7 +3549,7 @@
             <a:fld id="{C08094CF-D84A-4161-9F88-9244F515EB29}" type="slidenum">
               <a:rPr lang="pt-BR" smtClean="0"/>
               <a:pPr/>
-              <a:t>7</a:t>
+              <a:t>9</a:t>
             </a:fld>
             <a:endParaRPr lang="pt-BR"/>
           </a:p>
@@ -3565,41 +3611,43 @@
           <a:p>
             <a:r>
               <a:rPr lang="pt-BR" dirty="0" smtClean="0"/>
-              <a:t>Para os atributos dos </a:t>
-            </a:r>
-            <a:r>
-              <a:rPr lang="pt-BR" dirty="0" err="1" smtClean="0"/>
+              <a:t>Além</a:t>
+            </a:r>
+            <a:r>
+              <a:rPr lang="pt-BR" baseline="0" dirty="0" smtClean="0"/>
+              <a:t> dos atributos, os </a:t>
+            </a:r>
+            <a:r>
+              <a:rPr lang="pt-BR" baseline="0" dirty="0" err="1" smtClean="0"/>
               <a:t>funcionarios</a:t>
             </a:r>
             <a:r>
-              <a:rPr lang="pt-BR" dirty="0" smtClean="0"/>
-              <a:t>, foi feito um estudo</a:t>
-            </a:r>
-            <a:r>
               <a:rPr lang="pt-BR" baseline="0" dirty="0" smtClean="0"/>
-              <a:t> sobre </a:t>
+              <a:t> possuem especializações. Estas </a:t>
             </a:r>
             <a:r>
               <a:rPr lang="pt-BR" baseline="0" dirty="0" err="1" smtClean="0"/>
-              <a:t>possiveis</a:t>
+              <a:t>especializacoes</a:t>
             </a:r>
             <a:r>
               <a:rPr lang="pt-BR" baseline="0" dirty="0" smtClean="0"/>
-              <a:t> </a:t>
+              <a:t> podem ser de 3 tipos: ferramentas, que são </a:t>
             </a:r>
             <a:r>
               <a:rPr lang="pt-BR" baseline="0" dirty="0" err="1" smtClean="0"/>
-              <a:t>caracteristicas</a:t>
+              <a:t>utilziadas</a:t>
             </a:r>
             <a:r>
               <a:rPr lang="pt-BR" baseline="0" dirty="0" smtClean="0"/>
-              <a:t> de pessoas que desempenham os papeis presentes no SDM.</a:t>
-            </a:r>
-          </a:p>
-          <a:p>
+              <a:t> para </a:t>
+            </a:r>
+            <a:r>
+              <a:rPr lang="pt-BR" baseline="0" dirty="0" err="1" smtClean="0"/>
+              <a:t>auxilar</a:t>
+            </a:r>
             <a:r>
               <a:rPr lang="pt-BR" baseline="0" dirty="0" smtClean="0"/>
-              <a:t>Refinando os resultados encontrados por Santos e Russo, foram escolhidos 9 atributos que representariam o </a:t>
+              <a:t> o </a:t>
             </a:r>
             <a:r>
               <a:rPr lang="pt-BR" baseline="0" dirty="0" err="1" smtClean="0"/>
@@ -3607,31 +3655,7 @@
             </a:r>
             <a:r>
               <a:rPr lang="pt-BR" baseline="0" dirty="0" smtClean="0"/>
-              <a:t>. Estes 9 atributos são utilizados para o calculo dos atributos de desempenho, que não são </a:t>
-            </a:r>
-            <a:r>
-              <a:rPr lang="pt-BR" baseline="0" dirty="0" err="1" smtClean="0"/>
-              <a:t>visiveis</a:t>
-            </a:r>
-            <a:r>
-              <a:rPr lang="pt-BR" baseline="0" dirty="0" smtClean="0"/>
-              <a:t> para o jogador. Como os </a:t>
-            </a:r>
-            <a:r>
-              <a:rPr lang="pt-BR" baseline="0" dirty="0" err="1" smtClean="0"/>
-              <a:t>unicos</a:t>
-            </a:r>
-            <a:r>
-              <a:rPr lang="pt-BR" baseline="0" dirty="0" smtClean="0"/>
-              <a:t> atributos exibidos ao jogador são os humanos, cabe ao jogador analisar estes atributos e deduzir qual </a:t>
-            </a:r>
-            <a:r>
-              <a:rPr lang="pt-BR" baseline="0" dirty="0" err="1" smtClean="0"/>
-              <a:t>papél</a:t>
-            </a:r>
-            <a:r>
-              <a:rPr lang="pt-BR" baseline="0" dirty="0" smtClean="0"/>
-              <a:t> é mais adequado para o </a:t>
+              <a:t>; de linguagem de programação e metodologia que são utilizados para avaliar o desempenho do </a:t>
             </a:r>
             <a:r>
               <a:rPr lang="pt-BR" baseline="0" dirty="0" err="1" smtClean="0"/>
@@ -3663,7 +3687,7 @@
             <a:fld id="{C08094CF-D84A-4161-9F88-9244F515EB29}" type="slidenum">
               <a:rPr lang="pt-BR" smtClean="0"/>
               <a:pPr/>
-              <a:t>8</a:t>
+              <a:t>10</a:t>
             </a:fld>
             <a:endParaRPr lang="pt-BR"/>
           </a:p>
@@ -3724,18 +3748,72 @@
           <a:lstStyle/>
           <a:p>
             <a:r>
-              <a:rPr lang="pt-BR" smtClean="0"/>
-              <a:t>Rascunho:</a:t>
-            </a:r>
-          </a:p>
-          <a:p>
-            <a:r>
-              <a:rPr lang="pt-BR" dirty="0" smtClean="0"/>
-              <a:t>No</a:t>
+              <a:rPr lang="pt-BR" dirty="0" smtClean="0"/>
+              <a:t>Caso</a:t>
             </a:r>
             <a:r>
               <a:rPr lang="pt-BR" baseline="0" dirty="0" smtClean="0"/>
-              <a:t> SDM tanto os </a:t>
+              <a:t> um </a:t>
+            </a:r>
+            <a:r>
+              <a:rPr lang="pt-BR" baseline="0" dirty="0" err="1" smtClean="0"/>
+              <a:t>funcionario</a:t>
+            </a:r>
+            <a:r>
+              <a:rPr lang="pt-BR" baseline="0" dirty="0" smtClean="0"/>
+              <a:t> não possua uma especialização, é </a:t>
+            </a:r>
+            <a:r>
+              <a:rPr lang="pt-BR" baseline="0" dirty="0" err="1" smtClean="0"/>
+              <a:t>possivel</a:t>
+            </a:r>
+            <a:r>
+              <a:rPr lang="pt-BR" baseline="0" dirty="0" smtClean="0"/>
+              <a:t> </a:t>
+            </a:r>
+            <a:r>
+              <a:rPr lang="pt-BR" baseline="0" dirty="0" err="1" smtClean="0"/>
+              <a:t>coloca-lo</a:t>
+            </a:r>
+            <a:r>
+              <a:rPr lang="pt-BR" baseline="0" dirty="0" smtClean="0"/>
+              <a:t> em treinamento para adquiri-la.</a:t>
+            </a:r>
+          </a:p>
+          <a:p>
+            <a:r>
+              <a:rPr lang="pt-BR" baseline="0" dirty="0" smtClean="0"/>
+              <a:t>Um outro aspecto do SDM é a relação de horas de trabalho, moral e estamina. As horas de trabalho é utilizada para afetar a negativamente a estamina caso trabalhe mais que 40 horas semanais e positivamente </a:t>
+            </a:r>
+            <a:r>
+              <a:rPr lang="pt-BR" baseline="0" dirty="0" err="1" smtClean="0"/>
+              <a:t>quaso</a:t>
+            </a:r>
+            <a:r>
+              <a:rPr lang="pt-BR" baseline="0" dirty="0" smtClean="0"/>
+              <a:t> trabalhe menos. O moral é afetado por promoções, </a:t>
+            </a:r>
+            <a:r>
+              <a:rPr lang="pt-BR" baseline="0" dirty="0" err="1" smtClean="0"/>
+              <a:t>conclusao</a:t>
+            </a:r>
+            <a:r>
+              <a:rPr lang="pt-BR" baseline="0" dirty="0" smtClean="0"/>
+              <a:t> de projetos e falta de pagamento. O moral em conjunto com a estamina são utilizados para calcular o rendimento do </a:t>
+            </a:r>
+            <a:r>
+              <a:rPr lang="pt-BR" baseline="0" dirty="0" err="1" smtClean="0"/>
+              <a:t>funcionario</a:t>
+            </a:r>
+            <a:r>
+              <a:rPr lang="pt-BR" baseline="0" dirty="0" smtClean="0"/>
+              <a:t>.</a:t>
+            </a:r>
+          </a:p>
+          <a:p>
+            <a:r>
+              <a:rPr lang="pt-BR" baseline="0" dirty="0" smtClean="0"/>
+              <a:t>No exemplo desta figura, é mostrado o ganho de estamina dos </a:t>
             </a:r>
             <a:r>
               <a:rPr lang="pt-BR" baseline="0" dirty="0" err="1" smtClean="0"/>
@@ -3743,107 +3821,8 @@
             </a:r>
             <a:r>
               <a:rPr lang="pt-BR" baseline="0" dirty="0" smtClean="0"/>
-              <a:t> quanto a empresa do jogador podem progredir com o passar do tempo de acordo com o desempenho.</a:t>
-            </a:r>
-          </a:p>
-          <a:p>
-            <a:endParaRPr lang="pt-BR" baseline="0" dirty="0" smtClean="0"/>
-          </a:p>
-          <a:p>
-            <a:r>
-              <a:rPr lang="pt-BR" baseline="0" dirty="0" smtClean="0"/>
-              <a:t>Os </a:t>
-            </a:r>
-            <a:r>
-              <a:rPr lang="pt-BR" baseline="0" dirty="0" err="1" smtClean="0"/>
-              <a:t>funcionarios</a:t>
-            </a:r>
-            <a:r>
-              <a:rPr lang="pt-BR" baseline="0" dirty="0" smtClean="0"/>
-              <a:t>, quando se termina um projeto, recebem uma quantia de pontos de </a:t>
-            </a:r>
-            <a:r>
-              <a:rPr lang="pt-BR" baseline="0" dirty="0" err="1" smtClean="0"/>
-              <a:t>experiencia</a:t>
-            </a:r>
-            <a:r>
-              <a:rPr lang="pt-BR" baseline="0" dirty="0" smtClean="0"/>
-              <a:t> (de acordo com a complexidade do projeto e do resultado final, se concluiu ou não). Quando um verto valor de </a:t>
-            </a:r>
-            <a:r>
-              <a:rPr lang="pt-BR" baseline="0" dirty="0" err="1" smtClean="0"/>
-              <a:t>experiencia</a:t>
-            </a:r>
-            <a:r>
-              <a:rPr lang="pt-BR" baseline="0" dirty="0" smtClean="0"/>
-              <a:t> é alcançado, o </a:t>
-            </a:r>
-            <a:r>
-              <a:rPr lang="pt-BR" baseline="0" dirty="0" err="1" smtClean="0"/>
-              <a:t>funcionario</a:t>
-            </a:r>
-            <a:r>
-              <a:rPr lang="pt-BR" baseline="0" dirty="0" smtClean="0"/>
-              <a:t> adquire um novo </a:t>
-            </a:r>
-            <a:r>
-              <a:rPr lang="pt-BR" baseline="0" dirty="0" err="1" smtClean="0"/>
-              <a:t>level</a:t>
-            </a:r>
-            <a:r>
-              <a:rPr lang="pt-BR" baseline="0" dirty="0" smtClean="0"/>
-              <a:t>, ganhando pontos em atributos de acordo com o papel desempenhado. Note que todos os atributos podem ser afetados, já que o desempenho em cada papel é influenciado por todos os atributos, mas com pesos diferentes.</a:t>
-            </a:r>
-          </a:p>
-          <a:p>
-            <a:endParaRPr lang="pt-BR" baseline="0" dirty="0" smtClean="0"/>
-          </a:p>
-          <a:p>
-            <a:r>
-              <a:rPr lang="pt-BR" baseline="0" dirty="0" smtClean="0"/>
-              <a:t>A empresa </a:t>
-            </a:r>
-            <a:r>
-              <a:rPr lang="pt-BR" baseline="0" dirty="0" err="1" smtClean="0"/>
-              <a:t>tambem</a:t>
-            </a:r>
-            <a:r>
-              <a:rPr lang="pt-BR" baseline="0" dirty="0" smtClean="0"/>
-              <a:t> ganha </a:t>
-            </a:r>
-            <a:r>
-              <a:rPr lang="pt-BR" baseline="0" dirty="0" err="1" smtClean="0"/>
-              <a:t>experiencia</a:t>
-            </a:r>
-            <a:r>
-              <a:rPr lang="pt-BR" baseline="0" dirty="0" smtClean="0"/>
-              <a:t> na conclusão de projetos, ou perde </a:t>
-            </a:r>
-            <a:r>
-              <a:rPr lang="pt-BR" baseline="0" dirty="0" err="1" smtClean="0"/>
-              <a:t>experiencia</a:t>
-            </a:r>
-            <a:r>
-              <a:rPr lang="pt-BR" baseline="0" dirty="0" smtClean="0"/>
-              <a:t> caso não tenha conseguido concluir. Conforme a empresa sobe de </a:t>
-            </a:r>
-            <a:r>
-              <a:rPr lang="pt-BR" baseline="0" dirty="0" err="1" smtClean="0"/>
-              <a:t>nivel</a:t>
-            </a:r>
-            <a:r>
-              <a:rPr lang="pt-BR" baseline="0" dirty="0" smtClean="0"/>
-              <a:t>, novos projetos (com mais complexidade) estarão </a:t>
-            </a:r>
-            <a:r>
-              <a:rPr lang="pt-BR" baseline="0" dirty="0" err="1" smtClean="0"/>
-              <a:t>disponiveis</a:t>
-            </a:r>
-            <a:r>
-              <a:rPr lang="pt-BR" baseline="0" dirty="0" smtClean="0"/>
-              <a:t> para o jogador, onde estes são mais desafiadores, mas fornecem mais recursos para possibilitar uma equipe de desenvolvimento maior.</a:t>
-            </a:r>
-            <a:endParaRPr lang="pt-BR" dirty="0"/>
+              <a:t> por estarem trabalhando menos horas.</a:t>
+            </a:r>
           </a:p>
         </p:txBody>
       </p:sp>
@@ -3865,7 +3844,7 @@
             <a:fld id="{C08094CF-D84A-4161-9F88-9244F515EB29}" type="slidenum">
               <a:rPr lang="pt-BR" smtClean="0"/>
               <a:pPr/>
-              <a:t>9</a:t>
+              <a:t>11</a:t>
             </a:fld>
             <a:endParaRPr lang="pt-BR"/>
           </a:p>
@@ -4061,7 +4040,7 @@
             <a:fld id="{6D9EE24F-E0DE-4DA1-9105-4F3C7EAC7004}" type="datetime1">
               <a:rPr lang="pt-BR" smtClean="0"/>
               <a:pPr/>
-              <a:t>19/10/2011</a:t>
+              <a:t>31/10/2011</a:t>
             </a:fld>
             <a:endParaRPr lang="pt-BR"/>
           </a:p>
@@ -4228,7 +4207,7 @@
             <a:fld id="{0F034B7C-B26C-4FD8-8AC7-000ADDE7D105}" type="datetime1">
               <a:rPr lang="pt-BR" smtClean="0"/>
               <a:pPr/>
-              <a:t>19/10/2011</a:t>
+              <a:t>31/10/2011</a:t>
             </a:fld>
             <a:endParaRPr lang="pt-BR"/>
           </a:p>
@@ -4405,7 +4384,7 @@
             <a:fld id="{A000051A-8B0B-43C8-BE21-E725CE790B54}" type="datetime1">
               <a:rPr lang="pt-BR" smtClean="0"/>
               <a:pPr/>
-              <a:t>19/10/2011</a:t>
+              <a:t>31/10/2011</a:t>
             </a:fld>
             <a:endParaRPr lang="pt-BR"/>
           </a:p>
@@ -4572,7 +4551,7 @@
             <a:fld id="{7A421BDB-495C-4BB5-AD49-58C300AE01CF}" type="datetime1">
               <a:rPr lang="pt-BR" smtClean="0"/>
               <a:pPr/>
-              <a:t>19/10/2011</a:t>
+              <a:t>31/10/2011</a:t>
             </a:fld>
             <a:endParaRPr lang="pt-BR"/>
           </a:p>
@@ -4815,7 +4794,7 @@
             <a:fld id="{D3F8C441-06B8-491B-8ED8-D1AF83395783}" type="datetime1">
               <a:rPr lang="pt-BR" smtClean="0"/>
               <a:pPr/>
-              <a:t>19/10/2011</a:t>
+              <a:t>31/10/2011</a:t>
             </a:fld>
             <a:endParaRPr lang="pt-BR"/>
           </a:p>
@@ -5100,7 +5079,7 @@
             <a:fld id="{45531767-6CF3-40F5-BBA2-043B826B2267}" type="datetime1">
               <a:rPr lang="pt-BR" smtClean="0"/>
               <a:pPr/>
-              <a:t>19/10/2011</a:t>
+              <a:t>31/10/2011</a:t>
             </a:fld>
             <a:endParaRPr lang="pt-BR"/>
           </a:p>
@@ -5519,7 +5498,7 @@
             <a:fld id="{EDD351A9-C1FF-4899-99DB-C6738D3C7571}" type="datetime1">
               <a:rPr lang="pt-BR" smtClean="0"/>
               <a:pPr/>
-              <a:t>19/10/2011</a:t>
+              <a:t>31/10/2011</a:t>
             </a:fld>
             <a:endParaRPr lang="pt-BR"/>
           </a:p>
@@ -5634,7 +5613,7 @@
             <a:fld id="{A3E5940B-4769-4153-8D5F-9FF733D34FF4}" type="datetime1">
               <a:rPr lang="pt-BR" smtClean="0"/>
               <a:pPr/>
-              <a:t>19/10/2011</a:t>
+              <a:t>31/10/2011</a:t>
             </a:fld>
             <a:endParaRPr lang="pt-BR"/>
           </a:p>
@@ -5726,7 +5705,7 @@
             <a:fld id="{C2FBDFD4-FA6C-48AF-81DB-D21C39C8F84C}" type="datetime1">
               <a:rPr lang="pt-BR" smtClean="0"/>
               <a:pPr/>
-              <a:t>19/10/2011</a:t>
+              <a:t>31/10/2011</a:t>
             </a:fld>
             <a:endParaRPr lang="pt-BR"/>
           </a:p>
@@ -6000,7 +5979,7 @@
             <a:fld id="{4BE47F20-0339-42AE-B0FF-033D3E7FC8FA}" type="datetime1">
               <a:rPr lang="pt-BR" smtClean="0"/>
               <a:pPr/>
-              <a:t>19/10/2011</a:t>
+              <a:t>31/10/2011</a:t>
             </a:fld>
             <a:endParaRPr lang="pt-BR"/>
           </a:p>
@@ -6250,7 +6229,7 @@
             <a:fld id="{4B99D162-A012-4A91-9D82-D9E2E9C8A2D2}" type="datetime1">
               <a:rPr lang="pt-BR" smtClean="0"/>
               <a:pPr/>
-              <a:t>19/10/2011</a:t>
+              <a:t>31/10/2011</a:t>
             </a:fld>
             <a:endParaRPr lang="pt-BR"/>
           </a:p>
@@ -6484,7 +6463,7 @@
             <a:fld id="{486B1B35-5594-478C-AA32-C02987ED0CAA}" type="datetime1">
               <a:rPr lang="pt-BR" smtClean="0"/>
               <a:pPr/>
-              <a:t>19/10/2011</a:t>
+              <a:t>31/10/2011</a:t>
             </a:fld>
             <a:endParaRPr lang="pt-BR"/>
           </a:p>
@@ -6915,36 +6894,26 @@
         </p:spPr>
         <p:txBody>
           <a:bodyPr>
-            <a:normAutofit fontScale="70000" lnSpcReduction="20000"/>
+            <a:normAutofit/>
           </a:bodyPr>
           <a:lstStyle/>
           <a:p>
-            <a:r>
-              <a:rPr lang="pt-BR" dirty="0" err="1" smtClean="0"/>
+            <a:endParaRPr lang="pt-BR" b="1" dirty="0" smtClean="0"/>
+          </a:p>
+          <a:p>
+            <a:r>
+              <a:rPr lang="pt-BR" b="1" dirty="0" err="1" smtClean="0"/>
               <a:t>Troy</a:t>
             </a:r>
             <a:r>
-              <a:rPr lang="pt-BR" dirty="0" smtClean="0"/>
+              <a:rPr lang="pt-BR" b="1" dirty="0" smtClean="0"/>
               <a:t> Costa </a:t>
             </a:r>
             <a:r>
-              <a:rPr lang="pt-BR" dirty="0" err="1" smtClean="0"/>
+              <a:rPr lang="pt-BR" b="1" dirty="0" err="1" smtClean="0"/>
               <a:t>Kohwalter</a:t>
             </a:r>
-            <a:endParaRPr lang="pt-BR" dirty="0"/>
-          </a:p>
-          <a:p>
-            <a:endParaRPr lang="pt-BR" dirty="0" smtClean="0"/>
-          </a:p>
-          <a:p>
-            <a:r>
-              <a:rPr lang="pt-BR" dirty="0" err="1" smtClean="0"/>
-              <a:t>Advisors</a:t>
-            </a:r>
-            <a:r>
-              <a:rPr lang="pt-BR" dirty="0" smtClean="0"/>
-              <a:t>: </a:t>
-            </a:r>
+            <a:endParaRPr lang="pt-BR" b="1" dirty="0" smtClean="0"/>
           </a:p>
           <a:p>
             <a:r>
@@ -6971,15 +6940,6 @@
             <a:endParaRPr lang="pt-BR" dirty="0" smtClean="0">
               <a:hlinkClick r:id="rId3"/>
             </a:endParaRPr>
-          </a:p>
-          <a:p>
-            <a:r>
-              <a:rPr lang="pt-BR" dirty="0" smtClean="0">
-                <a:hlinkClick r:id="rId3"/>
-              </a:rPr>
-              <a:t>http://www.ic.uff.br/~tkohwalter/sdm/index.html</a:t>
-            </a:r>
-            <a:endParaRPr lang="pt-BR" dirty="0" smtClean="0"/>
           </a:p>
           <a:p>
             <a:endParaRPr lang="pt-BR" dirty="0"/>
@@ -7385,6 +7345,38 @@
           </a:p>
         </p:txBody>
       </p:sp>
+      <p:pic>
+        <p:nvPicPr>
+          <p:cNvPr id="2050" name="Picture 2"/>
+          <p:cNvPicPr>
+            <a:picLocks noChangeAspect="1" noChangeArrowheads="1"/>
+          </p:cNvPicPr>
+          <p:nvPr/>
+        </p:nvPicPr>
+        <p:blipFill>
+          <a:blip r:embed="rId5" cstate="print"/>
+          <a:srcRect/>
+          <a:stretch>
+            <a:fillRect/>
+          </a:stretch>
+        </p:blipFill>
+        <p:spPr bwMode="auto">
+          <a:xfrm>
+            <a:off x="6300192" y="3645024"/>
+            <a:ext cx="1076325" cy="762000"/>
+          </a:xfrm>
+          <a:prstGeom prst="rect">
+            <a:avLst/>
+          </a:prstGeom>
+          <a:noFill/>
+          <a:ln w="9525">
+            <a:noFill/>
+            <a:miter lim="800000"/>
+            <a:headEnd/>
+            <a:tailEnd/>
+          </a:ln>
+        </p:spPr>
+      </p:pic>
     </p:spTree>
   </p:cSld>
   <p:clrMapOvr>
@@ -7965,9 +7957,8 @@
           <a:p>
             <a:r>
               <a:rPr lang="pt-BR" dirty="0" smtClean="0"/>
-              <a:t>SDM</a:t>
-            </a:r>
-            <a:endParaRPr lang="pt-BR" dirty="0"/>
+              <a:t>CONCLUSION</a:t>
+            </a:r>
           </a:p>
         </p:txBody>
       </p:sp>
@@ -7986,51 +7977,50 @@
           <a:bodyPr/>
           <a:lstStyle/>
           <a:p>
-            <a:r>
-              <a:rPr lang="pt-BR" dirty="0" smtClean="0"/>
-              <a:t>CONCLUSION</a:t>
+            <a:endParaRPr lang="pt-BR" dirty="0" smtClean="0"/>
+          </a:p>
+          <a:p>
+            <a:r>
+              <a:rPr lang="pt-BR" dirty="0" smtClean="0"/>
+              <a:t>UNDERSTANDING AND LEARNING</a:t>
             </a:r>
           </a:p>
           <a:p>
             <a:pPr lvl="1"/>
             <a:r>
               <a:rPr lang="pt-BR" dirty="0" smtClean="0"/>
-              <a:t>UNDERSTANDING</a:t>
-            </a:r>
+              <a:t>EMPLOYEE AND ROLES</a:t>
+            </a:r>
+            <a:endParaRPr lang="pt-BR" dirty="0" smtClean="0"/>
           </a:p>
           <a:p>
             <a:pPr lvl="1"/>
             <a:endParaRPr lang="pt-BR" dirty="0" smtClean="0"/>
           </a:p>
           <a:p>
+            <a:r>
+              <a:rPr lang="pt-BR" dirty="0" smtClean="0"/>
+              <a:t>LIMITATIONS</a:t>
+            </a:r>
+          </a:p>
+          <a:p>
             <a:pPr lvl="1"/>
             <a:r>
               <a:rPr lang="pt-BR" dirty="0" smtClean="0"/>
-              <a:t>LEARNING</a:t>
-            </a:r>
+              <a:t>CHANGE ITERATION PERIOD</a:t>
+            </a:r>
+          </a:p>
+          <a:p>
+            <a:pPr lvl="1"/>
+            <a:r>
+              <a:rPr lang="pt-BR" dirty="0" smtClean="0"/>
+              <a:t>METHOLOGY</a:t>
+            </a:r>
+            <a:endParaRPr lang="pt-BR" dirty="0" smtClean="0"/>
           </a:p>
           <a:p>
             <a:pPr lvl="1"/>
             <a:endParaRPr lang="pt-BR" dirty="0" smtClean="0"/>
-          </a:p>
-          <a:p>
-            <a:pPr lvl="1"/>
-            <a:r>
-              <a:rPr lang="pt-BR" dirty="0" smtClean="0"/>
-              <a:t>LIMITATIONS</a:t>
-            </a:r>
-          </a:p>
-          <a:p>
-            <a:pPr lvl="1"/>
-            <a:endParaRPr lang="pt-BR" dirty="0" smtClean="0"/>
-          </a:p>
-          <a:p>
-            <a:pPr lvl="1"/>
-            <a:r>
-              <a:rPr lang="pt-BR" dirty="0" smtClean="0"/>
-              <a:t>FUTURE WORK</a:t>
-            </a:r>
-            <a:endParaRPr lang="pt-BR" dirty="0"/>
           </a:p>
         </p:txBody>
       </p:sp>
@@ -8097,6 +8087,122 @@
             <a:spLocks noGrp="1"/>
           </p:cNvSpPr>
           <p:nvPr>
+            <p:ph type="title"/>
+          </p:nvPr>
+        </p:nvSpPr>
+        <p:spPr/>
+        <p:txBody>
+          <a:bodyPr/>
+          <a:lstStyle/>
+          <a:p>
+            <a:r>
+              <a:rPr lang="pt-BR" dirty="0" smtClean="0"/>
+              <a:t>FUTURE WORK</a:t>
+            </a:r>
+            <a:endParaRPr lang="pt-BR" dirty="0"/>
+          </a:p>
+        </p:txBody>
+      </p:sp>
+      <p:sp>
+        <p:nvSpPr>
+          <p:cNvPr id="3" name="Content Placeholder 2"/>
+          <p:cNvSpPr>
+            <a:spLocks noGrp="1"/>
+          </p:cNvSpPr>
+          <p:nvPr>
+            <p:ph idx="1"/>
+          </p:nvPr>
+        </p:nvSpPr>
+        <p:spPr/>
+        <p:txBody>
+          <a:bodyPr/>
+          <a:lstStyle/>
+          <a:p>
+            <a:endParaRPr lang="pt-BR" dirty="0" smtClean="0"/>
+          </a:p>
+          <a:p>
+            <a:r>
+              <a:rPr lang="pt-BR" dirty="0" smtClean="0"/>
+              <a:t>MULTIPLE OFFICES</a:t>
+            </a:r>
+          </a:p>
+          <a:p>
+            <a:endParaRPr lang="pt-BR" dirty="0" smtClean="0"/>
+          </a:p>
+          <a:p>
+            <a:r>
+              <a:rPr lang="pt-BR" dirty="0" smtClean="0"/>
+              <a:t>COMPANY REPUTATION</a:t>
+            </a:r>
+          </a:p>
+          <a:p>
+            <a:endParaRPr lang="pt-BR" dirty="0" smtClean="0"/>
+          </a:p>
+          <a:p>
+            <a:r>
+              <a:rPr lang="pt-BR" dirty="0" smtClean="0"/>
+              <a:t>STORYTELLING</a:t>
+            </a:r>
+            <a:endParaRPr lang="pt-BR" dirty="0" smtClean="0"/>
+          </a:p>
+        </p:txBody>
+      </p:sp>
+      <p:sp>
+        <p:nvSpPr>
+          <p:cNvPr id="4" name="Slide Number Placeholder 3"/>
+          <p:cNvSpPr>
+            <a:spLocks noGrp="1"/>
+          </p:cNvSpPr>
+          <p:nvPr>
+            <p:ph type="sldNum" sz="quarter" idx="12"/>
+          </p:nvPr>
+        </p:nvSpPr>
+        <p:spPr/>
+        <p:txBody>
+          <a:bodyPr/>
+          <a:lstStyle/>
+          <a:p>
+            <a:fld id="{3423915D-51A9-4757-B8AC-B60F99CD8957}" type="slidenum">
+              <a:rPr lang="pt-BR" smtClean="0"/>
+              <a:pPr/>
+              <a:t>16</a:t>
+            </a:fld>
+            <a:endParaRPr lang="pt-BR"/>
+          </a:p>
+        </p:txBody>
+      </p:sp>
+    </p:spTree>
+  </p:cSld>
+  <p:clrMapOvr>
+    <a:masterClrMapping/>
+  </p:clrMapOvr>
+</p:sld>
+</file>
+
+<file path=ppt/slides/slide17.xml><?xml version="1.0" encoding="utf-8"?>
+<p:sld xmlns:a="http://schemas.openxmlformats.org/drawingml/2006/main" xmlns:r="http://schemas.openxmlformats.org/officeDocument/2006/relationships" xmlns:p="http://schemas.openxmlformats.org/presentationml/2006/main">
+  <p:cSld>
+    <p:spTree>
+      <p:nvGrpSpPr>
+        <p:cNvPr id="1" name=""/>
+        <p:cNvGrpSpPr/>
+        <p:nvPr/>
+      </p:nvGrpSpPr>
+      <p:grpSpPr>
+        <a:xfrm>
+          <a:off x="0" y="0"/>
+          <a:ext cx="0" cy="0"/>
+          <a:chOff x="0" y="0"/>
+          <a:chExt cx="0" cy="0"/>
+        </a:xfrm>
+      </p:grpSpPr>
+      <p:sp>
+        <p:nvSpPr>
+          <p:cNvPr id="2" name="Title 1"/>
+          <p:cNvSpPr>
+            <a:spLocks noGrp="1"/>
+          </p:cNvSpPr>
+          <p:nvPr>
             <p:ph type="ctrTitle"/>
           </p:nvPr>
         </p:nvSpPr>
@@ -8149,36 +8255,23 @@
         </p:spPr>
         <p:txBody>
           <a:bodyPr>
-            <a:normAutofit fontScale="70000" lnSpcReduction="20000"/>
+            <a:normAutofit fontScale="92500" lnSpcReduction="20000"/>
           </a:bodyPr>
           <a:lstStyle/>
           <a:p>
             <a:r>
-              <a:rPr lang="pt-BR" dirty="0" err="1" smtClean="0"/>
+              <a:rPr lang="pt-BR" b="1" dirty="0" err="1" smtClean="0"/>
               <a:t>Troy</a:t>
             </a:r>
             <a:r>
-              <a:rPr lang="pt-BR" dirty="0" smtClean="0"/>
+              <a:rPr lang="pt-BR" b="1" dirty="0" smtClean="0"/>
               <a:t> Costa </a:t>
             </a:r>
             <a:r>
-              <a:rPr lang="pt-BR" dirty="0" err="1" smtClean="0"/>
+              <a:rPr lang="pt-BR" b="1" dirty="0" err="1" smtClean="0"/>
               <a:t>Kohwalter</a:t>
             </a:r>
-            <a:endParaRPr lang="pt-BR" dirty="0"/>
-          </a:p>
-          <a:p>
-            <a:endParaRPr lang="pt-BR" dirty="0" smtClean="0"/>
-          </a:p>
-          <a:p>
-            <a:r>
-              <a:rPr lang="pt-BR" dirty="0" err="1" smtClean="0"/>
-              <a:t>Advisors</a:t>
-            </a:r>
-            <a:r>
-              <a:rPr lang="pt-BR" dirty="0" smtClean="0"/>
-              <a:t>: </a:t>
-            </a:r>
+            <a:endParaRPr lang="pt-BR" b="1" dirty="0" smtClean="0"/>
           </a:p>
           <a:p>
             <a:r>
@@ -8206,10 +8299,16 @@
           </a:p>
           <a:p>
             <a:r>
+              <a:rPr lang="pt-BR" dirty="0" smtClean="0"/>
+              <a:t>Game Access:</a:t>
+            </a:r>
+          </a:p>
+          <a:p>
+            <a:r>
               <a:rPr lang="pt-BR" dirty="0" smtClean="0">
                 <a:hlinkClick r:id="rId2"/>
               </a:rPr>
-              <a:t>http://www.ic.uff.br/~tkohwalter/sdm/index.html</a:t>
+              <a:t>http://www.ic.uff.br/~tkohwalter/sdm/</a:t>
             </a:r>
             <a:endParaRPr lang="pt-BR" dirty="0" smtClean="0"/>
           </a:p>
@@ -8230,6 +8329,332 @@
       </p:par>
     </p:tnLst>
   </p:timing>
+</p:sld>
+</file>
+
+<file path=ppt/slides/slide18.xml><?xml version="1.0" encoding="utf-8"?>
+<p:sld xmlns:a="http://schemas.openxmlformats.org/drawingml/2006/main" xmlns:r="http://schemas.openxmlformats.org/officeDocument/2006/relationships" xmlns:p="http://schemas.openxmlformats.org/presentationml/2006/main">
+  <p:cSld>
+    <p:spTree>
+      <p:nvGrpSpPr>
+        <p:cNvPr id="1" name=""/>
+        <p:cNvGrpSpPr/>
+        <p:nvPr/>
+      </p:nvGrpSpPr>
+      <p:grpSpPr>
+        <a:xfrm>
+          <a:off x="0" y="0"/>
+          <a:ext cx="0" cy="0"/>
+          <a:chOff x="0" y="0"/>
+          <a:chExt cx="0" cy="0"/>
+        </a:xfrm>
+      </p:grpSpPr>
+      <p:sp>
+        <p:nvSpPr>
+          <p:cNvPr id="2" name="Title 1"/>
+          <p:cNvSpPr>
+            <a:spLocks noGrp="1"/>
+          </p:cNvSpPr>
+          <p:nvPr>
+            <p:ph type="title"/>
+          </p:nvPr>
+        </p:nvSpPr>
+        <p:spPr/>
+        <p:txBody>
+          <a:bodyPr/>
+          <a:lstStyle/>
+          <a:p>
+            <a:r>
+              <a:rPr lang="pt-BR" dirty="0" smtClean="0"/>
+              <a:t>SDM</a:t>
+            </a:r>
+            <a:endParaRPr lang="pt-BR" dirty="0"/>
+          </a:p>
+        </p:txBody>
+      </p:sp>
+      <p:sp>
+        <p:nvSpPr>
+          <p:cNvPr id="3" name="Content Placeholder 2"/>
+          <p:cNvSpPr>
+            <a:spLocks noGrp="1"/>
+          </p:cNvSpPr>
+          <p:nvPr>
+            <p:ph idx="1"/>
+          </p:nvPr>
+        </p:nvSpPr>
+        <p:spPr/>
+        <p:txBody>
+          <a:bodyPr>
+            <a:normAutofit/>
+          </a:bodyPr>
+          <a:lstStyle/>
+          <a:p>
+            <a:r>
+              <a:rPr lang="pt-BR" dirty="0" smtClean="0"/>
+              <a:t>EMPLOYEES</a:t>
+            </a:r>
+          </a:p>
+          <a:p>
+            <a:endParaRPr lang="pt-BR" dirty="0" smtClean="0"/>
+          </a:p>
+          <a:p>
+            <a:pPr lvl="1"/>
+            <a:r>
+              <a:rPr lang="pt-BR" smtClean="0"/>
+              <a:t>GRADES</a:t>
+            </a:r>
+            <a:endParaRPr lang="pt-BR" dirty="0" smtClean="0"/>
+          </a:p>
+          <a:p>
+            <a:pPr lvl="1"/>
+            <a:endParaRPr lang="pt-BR" dirty="0" smtClean="0"/>
+          </a:p>
+          <a:p>
+            <a:pPr lvl="2"/>
+            <a:r>
+              <a:rPr lang="pt-BR" dirty="0" smtClean="0"/>
+              <a:t>JUNIOR</a:t>
+            </a:r>
+          </a:p>
+          <a:p>
+            <a:pPr lvl="2"/>
+            <a:endParaRPr lang="pt-BR" dirty="0" smtClean="0"/>
+          </a:p>
+          <a:p>
+            <a:pPr lvl="2"/>
+            <a:r>
+              <a:rPr lang="pt-BR" dirty="0" smtClean="0"/>
+              <a:t>MID-LEVEL</a:t>
+            </a:r>
+          </a:p>
+          <a:p>
+            <a:pPr lvl="2"/>
+            <a:endParaRPr lang="pt-BR" dirty="0" smtClean="0"/>
+          </a:p>
+          <a:p>
+            <a:pPr lvl="2"/>
+            <a:r>
+              <a:rPr lang="pt-BR" dirty="0" smtClean="0"/>
+              <a:t>SENIOR</a:t>
+            </a:r>
+          </a:p>
+          <a:p>
+            <a:pPr>
+              <a:buNone/>
+            </a:pPr>
+            <a:endParaRPr lang="pt-BR" dirty="0" smtClean="0"/>
+          </a:p>
+          <a:p>
+            <a:endParaRPr lang="pt-BR" dirty="0"/>
+          </a:p>
+        </p:txBody>
+      </p:sp>
+      <p:sp>
+        <p:nvSpPr>
+          <p:cNvPr id="6" name="Espaço Reservado para Número de Slide 5"/>
+          <p:cNvSpPr>
+            <a:spLocks noGrp="1"/>
+          </p:cNvSpPr>
+          <p:nvPr>
+            <p:ph type="sldNum" sz="quarter" idx="12"/>
+          </p:nvPr>
+        </p:nvSpPr>
+        <p:spPr/>
+        <p:txBody>
+          <a:bodyPr/>
+          <a:lstStyle/>
+          <a:p>
+            <a:fld id="{3423915D-51A9-4757-B8AC-B60F99CD8957}" type="slidenum">
+              <a:rPr lang="pt-BR" smtClean="0"/>
+              <a:pPr/>
+              <a:t>18</a:t>
+            </a:fld>
+            <a:endParaRPr lang="pt-BR"/>
+          </a:p>
+        </p:txBody>
+      </p:sp>
+      <p:pic>
+        <p:nvPicPr>
+          <p:cNvPr id="7" name="Picture 3"/>
+          <p:cNvPicPr>
+            <a:picLocks noChangeAspect="1" noChangeArrowheads="1"/>
+          </p:cNvPicPr>
+          <p:nvPr/>
+        </p:nvPicPr>
+        <p:blipFill>
+          <a:blip r:embed="rId3" cstate="print"/>
+          <a:srcRect/>
+          <a:stretch>
+            <a:fillRect/>
+          </a:stretch>
+        </p:blipFill>
+        <p:spPr bwMode="auto">
+          <a:xfrm>
+            <a:off x="3851920" y="2276872"/>
+            <a:ext cx="4738010" cy="2952328"/>
+          </a:xfrm>
+          <a:prstGeom prst="rect">
+            <a:avLst/>
+          </a:prstGeom>
+          <a:noFill/>
+          <a:ln w="9525">
+            <a:noFill/>
+            <a:miter lim="800000"/>
+            <a:headEnd/>
+            <a:tailEnd/>
+          </a:ln>
+        </p:spPr>
+      </p:pic>
+    </p:spTree>
+  </p:cSld>
+  <p:clrMapOvr>
+    <a:masterClrMapping/>
+  </p:clrMapOvr>
+  <p:timing>
+    <p:tnLst>
+      <p:par>
+        <p:cTn id="1" dur="indefinite" restart="never" nodeType="tmRoot"/>
+      </p:par>
+    </p:tnLst>
+  </p:timing>
+</p:sld>
+</file>
+
+<file path=ppt/slides/slide19.xml><?xml version="1.0" encoding="utf-8"?>
+<p:sld xmlns:a="http://schemas.openxmlformats.org/drawingml/2006/main" xmlns:r="http://schemas.openxmlformats.org/officeDocument/2006/relationships" xmlns:p="http://schemas.openxmlformats.org/presentationml/2006/main">
+  <p:cSld>
+    <p:spTree>
+      <p:nvGrpSpPr>
+        <p:cNvPr id="1" name=""/>
+        <p:cNvGrpSpPr/>
+        <p:nvPr/>
+      </p:nvGrpSpPr>
+      <p:grpSpPr>
+        <a:xfrm>
+          <a:off x="0" y="0"/>
+          <a:ext cx="0" cy="0"/>
+          <a:chOff x="0" y="0"/>
+          <a:chExt cx="0" cy="0"/>
+        </a:xfrm>
+      </p:grpSpPr>
+      <p:sp>
+        <p:nvSpPr>
+          <p:cNvPr id="2" name="Title 1"/>
+          <p:cNvSpPr>
+            <a:spLocks noGrp="1"/>
+          </p:cNvSpPr>
+          <p:nvPr>
+            <p:ph type="title"/>
+          </p:nvPr>
+        </p:nvSpPr>
+        <p:spPr/>
+        <p:txBody>
+          <a:bodyPr/>
+          <a:lstStyle/>
+          <a:p>
+            <a:r>
+              <a:rPr lang="pt-BR" dirty="0" smtClean="0"/>
+              <a:t>ITERATIONS</a:t>
+            </a:r>
+            <a:endParaRPr lang="pt-BR" dirty="0"/>
+          </a:p>
+        </p:txBody>
+      </p:sp>
+      <p:sp>
+        <p:nvSpPr>
+          <p:cNvPr id="4" name="Slide Number Placeholder 3"/>
+          <p:cNvSpPr>
+            <a:spLocks noGrp="1"/>
+          </p:cNvSpPr>
+          <p:nvPr>
+            <p:ph type="sldNum" sz="quarter" idx="12"/>
+          </p:nvPr>
+        </p:nvSpPr>
+        <p:spPr/>
+        <p:txBody>
+          <a:bodyPr/>
+          <a:lstStyle/>
+          <a:p>
+            <a:fld id="{3423915D-51A9-4757-B8AC-B60F99CD8957}" type="slidenum">
+              <a:rPr lang="pt-BR" smtClean="0"/>
+              <a:pPr/>
+              <a:t>19</a:t>
+            </a:fld>
+            <a:endParaRPr lang="pt-BR"/>
+          </a:p>
+        </p:txBody>
+      </p:sp>
+      <p:pic>
+        <p:nvPicPr>
+          <p:cNvPr id="1026" name="Picture 2"/>
+          <p:cNvPicPr>
+            <a:picLocks noGrp="1" noChangeAspect="1" noChangeArrowheads="1"/>
+          </p:cNvPicPr>
+          <p:nvPr>
+            <p:ph idx="1"/>
+          </p:nvPr>
+        </p:nvPicPr>
+        <p:blipFill>
+          <a:blip r:embed="rId2" cstate="print"/>
+          <a:srcRect/>
+          <a:stretch>
+            <a:fillRect/>
+          </a:stretch>
+        </p:blipFill>
+        <p:spPr bwMode="auto">
+          <a:xfrm>
+            <a:off x="2123728" y="1533370"/>
+            <a:ext cx="4850904" cy="2255670"/>
+          </a:xfrm>
+          <a:prstGeom prst="rect">
+            <a:avLst/>
+          </a:prstGeom>
+          <a:noFill/>
+          <a:ln w="9525">
+            <a:noFill/>
+            <a:miter lim="800000"/>
+            <a:headEnd/>
+            <a:tailEnd/>
+          </a:ln>
+        </p:spPr>
+      </p:pic>
+      <p:pic>
+        <p:nvPicPr>
+          <p:cNvPr id="1027" name="Picture 3"/>
+          <p:cNvPicPr>
+            <a:picLocks noChangeAspect="1" noChangeArrowheads="1"/>
+          </p:cNvPicPr>
+          <p:nvPr/>
+        </p:nvPicPr>
+        <p:blipFill>
+          <a:blip r:embed="rId3" cstate="print"/>
+          <a:srcRect/>
+          <a:stretch>
+            <a:fillRect/>
+          </a:stretch>
+        </p:blipFill>
+        <p:spPr bwMode="auto">
+          <a:xfrm>
+            <a:off x="2123728" y="3934258"/>
+            <a:ext cx="4824536" cy="2231046"/>
+          </a:xfrm>
+          <a:prstGeom prst="rect">
+            <a:avLst/>
+          </a:prstGeom>
+          <a:noFill/>
+          <a:ln w="9525">
+            <a:noFill/>
+            <a:miter lim="800000"/>
+            <a:headEnd/>
+            <a:tailEnd/>
+          </a:ln>
+        </p:spPr>
+      </p:pic>
+    </p:spTree>
+  </p:cSld>
+  <p:clrMapOvr>
+    <a:masterClrMapping/>
+  </p:clrMapOvr>
 </p:sld>
 </file>
 
@@ -8285,12 +8710,14 @@
         </p:nvSpPr>
         <p:spPr/>
         <p:txBody>
-          <a:bodyPr/>
-          <a:lstStyle/>
-          <a:p>
-            <a:r>
-              <a:rPr lang="pt-BR" dirty="0" smtClean="0"/>
-              <a:t>TEORIC CLASSES</a:t>
+          <a:bodyPr>
+            <a:normAutofit fontScale="92500" lnSpcReduction="10000"/>
+          </a:bodyPr>
+          <a:lstStyle/>
+          <a:p>
+            <a:r>
+              <a:rPr lang="pt-BR" dirty="0" smtClean="0"/>
+              <a:t>THEORIC CLASSES</a:t>
             </a:r>
           </a:p>
           <a:p>
@@ -8299,17 +8726,48 @@
           <a:p>
             <a:r>
               <a:rPr lang="pt-BR" dirty="0" smtClean="0"/>
-              <a:t>TRABALHOS PRATICOS</a:t>
-            </a:r>
-          </a:p>
-          <a:p>
+              <a:t>PRATICAL WORK</a:t>
+            </a:r>
+          </a:p>
+          <a:p>
+            <a:endParaRPr lang="pt-BR" dirty="0" smtClean="0"/>
+          </a:p>
+          <a:p>
+            <a:r>
+              <a:rPr lang="pt-BR" dirty="0" smtClean="0"/>
+              <a:t>GAME</a:t>
+            </a:r>
+          </a:p>
+          <a:p>
+            <a:pPr lvl="1"/>
+            <a:r>
+              <a:rPr lang="pt-BR" dirty="0" smtClean="0"/>
+              <a:t>EDUCATION </a:t>
+            </a:r>
+          </a:p>
+          <a:p>
+            <a:pPr lvl="1"/>
+            <a:r>
+              <a:rPr lang="pt-BR" dirty="0" smtClean="0"/>
+              <a:t>TRAINING</a:t>
+            </a:r>
+          </a:p>
+          <a:p>
+            <a:pPr lvl="1"/>
+            <a:endParaRPr lang="pt-BR" dirty="0" smtClean="0"/>
+          </a:p>
+          <a:p>
+            <a:r>
+              <a:rPr lang="pt-BR" dirty="0" smtClean="0"/>
+              <a:t>GAMEFICATION</a:t>
+            </a:r>
+            <a:endParaRPr lang="pt-BR" dirty="0" smtClean="0"/>
+          </a:p>
+          <a:p>
+            <a:pPr>
+              <a:buNone/>
+            </a:pPr>
             <a:endParaRPr lang="pt-BR" dirty="0"/>
-          </a:p>
-          <a:p>
-            <a:r>
-              <a:rPr lang="pt-BR" dirty="0" smtClean="0"/>
-              <a:t>GAMES</a:t>
-            </a:r>
           </a:p>
         </p:txBody>
       </p:sp>
@@ -8334,6 +8792,382 @@
               <a:t>2</a:t>
             </a:fld>
             <a:endParaRPr lang="pt-BR"/>
+          </a:p>
+        </p:txBody>
+      </p:sp>
+    </p:spTree>
+  </p:cSld>
+  <p:clrMapOvr>
+    <a:masterClrMapping/>
+  </p:clrMapOvr>
+  <p:timing>
+    <p:tnLst>
+      <p:par>
+        <p:cTn id="1" dur="indefinite" restart="never" nodeType="tmRoot"/>
+      </p:par>
+    </p:tnLst>
+  </p:timing>
+</p:sld>
+</file>
+
+<file path=ppt/slides/slide20.xml><?xml version="1.0" encoding="utf-8"?>
+<p:sld xmlns:a="http://schemas.openxmlformats.org/drawingml/2006/main" xmlns:r="http://schemas.openxmlformats.org/officeDocument/2006/relationships" xmlns:p="http://schemas.openxmlformats.org/presentationml/2006/main">
+  <p:cSld>
+    <p:spTree>
+      <p:nvGrpSpPr>
+        <p:cNvPr id="1" name=""/>
+        <p:cNvGrpSpPr/>
+        <p:nvPr/>
+      </p:nvGrpSpPr>
+      <p:grpSpPr>
+        <a:xfrm>
+          <a:off x="0" y="0"/>
+          <a:ext cx="0" cy="0"/>
+          <a:chOff x="0" y="0"/>
+          <a:chExt cx="0" cy="0"/>
+        </a:xfrm>
+      </p:grpSpPr>
+      <p:sp>
+        <p:nvSpPr>
+          <p:cNvPr id="2" name="Title 1"/>
+          <p:cNvSpPr>
+            <a:spLocks noGrp="1"/>
+          </p:cNvSpPr>
+          <p:nvPr>
+            <p:ph type="title"/>
+          </p:nvPr>
+        </p:nvSpPr>
+        <p:spPr/>
+        <p:txBody>
+          <a:bodyPr>
+            <a:normAutofit fontScale="90000"/>
+          </a:bodyPr>
+          <a:lstStyle/>
+          <a:p>
+            <a:r>
+              <a:rPr lang="pt-BR" dirty="0" smtClean="0"/>
+              <a:t>HUMAN ATTRIBUTES X PERFORMANCE</a:t>
+            </a:r>
+            <a:endParaRPr lang="pt-BR" dirty="0"/>
+          </a:p>
+        </p:txBody>
+      </p:sp>
+      <p:sp>
+        <p:nvSpPr>
+          <p:cNvPr id="4" name="Slide Number Placeholder 3"/>
+          <p:cNvSpPr>
+            <a:spLocks noGrp="1"/>
+          </p:cNvSpPr>
+          <p:nvPr>
+            <p:ph type="sldNum" sz="quarter" idx="12"/>
+          </p:nvPr>
+        </p:nvSpPr>
+        <p:spPr/>
+        <p:txBody>
+          <a:bodyPr/>
+          <a:lstStyle/>
+          <a:p>
+            <a:fld id="{3423915D-51A9-4757-B8AC-B60F99CD8957}" type="slidenum">
+              <a:rPr lang="pt-BR" smtClean="0"/>
+              <a:pPr/>
+              <a:t>20</a:t>
+            </a:fld>
+            <a:endParaRPr lang="pt-BR"/>
+          </a:p>
+        </p:txBody>
+      </p:sp>
+      <p:pic>
+        <p:nvPicPr>
+          <p:cNvPr id="1028" name="Picture 4"/>
+          <p:cNvPicPr>
+            <a:picLocks noGrp="1" noChangeAspect="1" noChangeArrowheads="1"/>
+          </p:cNvPicPr>
+          <p:nvPr>
+            <p:ph idx="1"/>
+          </p:nvPr>
+        </p:nvPicPr>
+        <p:blipFill>
+          <a:blip r:embed="rId2" cstate="print"/>
+          <a:srcRect/>
+          <a:stretch>
+            <a:fillRect/>
+          </a:stretch>
+        </p:blipFill>
+        <p:spPr bwMode="auto">
+          <a:xfrm>
+            <a:off x="395536" y="2574467"/>
+            <a:ext cx="8388424" cy="2375602"/>
+          </a:xfrm>
+          <a:prstGeom prst="rect">
+            <a:avLst/>
+          </a:prstGeom>
+          <a:noFill/>
+          <a:ln w="9525">
+            <a:noFill/>
+            <a:miter lim="800000"/>
+            <a:headEnd/>
+            <a:tailEnd/>
+          </a:ln>
+        </p:spPr>
+      </p:pic>
+    </p:spTree>
+  </p:cSld>
+  <p:clrMapOvr>
+    <a:masterClrMapping/>
+  </p:clrMapOvr>
+</p:sld>
+</file>
+
+<file path=ppt/slides/slide21.xml><?xml version="1.0" encoding="utf-8"?>
+<p:sld xmlns:a="http://schemas.openxmlformats.org/drawingml/2006/main" xmlns:r="http://schemas.openxmlformats.org/officeDocument/2006/relationships" xmlns:p="http://schemas.openxmlformats.org/presentationml/2006/main">
+  <p:cSld>
+    <p:spTree>
+      <p:nvGrpSpPr>
+        <p:cNvPr id="1" name=""/>
+        <p:cNvGrpSpPr/>
+        <p:nvPr/>
+      </p:nvGrpSpPr>
+      <p:grpSpPr>
+        <a:xfrm>
+          <a:off x="0" y="0"/>
+          <a:ext cx="0" cy="0"/>
+          <a:chOff x="0" y="0"/>
+          <a:chExt cx="0" cy="0"/>
+        </a:xfrm>
+      </p:grpSpPr>
+      <p:sp>
+        <p:nvSpPr>
+          <p:cNvPr id="2" name="Title 1"/>
+          <p:cNvSpPr>
+            <a:spLocks noGrp="1"/>
+          </p:cNvSpPr>
+          <p:nvPr>
+            <p:ph type="title"/>
+          </p:nvPr>
+        </p:nvSpPr>
+        <p:spPr/>
+        <p:txBody>
+          <a:bodyPr>
+            <a:normAutofit/>
+          </a:bodyPr>
+          <a:lstStyle/>
+          <a:p>
+            <a:r>
+              <a:rPr lang="pt-BR" dirty="0" smtClean="0"/>
+              <a:t>SDM</a:t>
+            </a:r>
+            <a:endParaRPr lang="pt-BR" dirty="0"/>
+          </a:p>
+        </p:txBody>
+      </p:sp>
+      <p:pic>
+        <p:nvPicPr>
+          <p:cNvPr id="6148" name="Picture 4"/>
+          <p:cNvPicPr>
+            <a:picLocks noGrp="1" noChangeAspect="1" noChangeArrowheads="1"/>
+          </p:cNvPicPr>
+          <p:nvPr>
+            <p:ph idx="1"/>
+          </p:nvPr>
+        </p:nvPicPr>
+        <p:blipFill>
+          <a:blip r:embed="rId3" cstate="print"/>
+          <a:srcRect/>
+          <a:stretch>
+            <a:fillRect/>
+          </a:stretch>
+        </p:blipFill>
+        <p:spPr bwMode="auto">
+          <a:xfrm>
+            <a:off x="467544" y="1196752"/>
+            <a:ext cx="7735181" cy="5483152"/>
+          </a:xfrm>
+          <a:prstGeom prst="rect">
+            <a:avLst/>
+          </a:prstGeom>
+          <a:noFill/>
+          <a:ln w="9525">
+            <a:noFill/>
+            <a:miter lim="800000"/>
+            <a:headEnd/>
+            <a:tailEnd/>
+          </a:ln>
+        </p:spPr>
+      </p:pic>
+      <p:sp>
+        <p:nvSpPr>
+          <p:cNvPr id="4" name="Espaço Reservado para Número de Slide 3"/>
+          <p:cNvSpPr>
+            <a:spLocks noGrp="1"/>
+          </p:cNvSpPr>
+          <p:nvPr>
+            <p:ph type="sldNum" sz="quarter" idx="12"/>
+          </p:nvPr>
+        </p:nvSpPr>
+        <p:spPr/>
+        <p:txBody>
+          <a:bodyPr/>
+          <a:lstStyle/>
+          <a:p>
+            <a:fld id="{3423915D-51A9-4757-B8AC-B60F99CD8957}" type="slidenum">
+              <a:rPr lang="pt-BR" smtClean="0"/>
+              <a:pPr/>
+              <a:t>21</a:t>
+            </a:fld>
+            <a:endParaRPr lang="pt-BR"/>
+          </a:p>
+        </p:txBody>
+      </p:sp>
+    </p:spTree>
+  </p:cSld>
+  <p:clrMapOvr>
+    <a:masterClrMapping/>
+  </p:clrMapOvr>
+  <p:timing>
+    <p:tnLst>
+      <p:par>
+        <p:cTn id="1" dur="indefinite" restart="never" nodeType="tmRoot"/>
+      </p:par>
+    </p:tnLst>
+  </p:timing>
+</p:sld>
+</file>
+
+<file path=ppt/slides/slide22.xml><?xml version="1.0" encoding="utf-8"?>
+<p:sld xmlns:a="http://schemas.openxmlformats.org/drawingml/2006/main" xmlns:r="http://schemas.openxmlformats.org/officeDocument/2006/relationships" xmlns:p="http://schemas.openxmlformats.org/presentationml/2006/main">
+  <p:cSld>
+    <p:spTree>
+      <p:nvGrpSpPr>
+        <p:cNvPr id="1" name=""/>
+        <p:cNvGrpSpPr/>
+        <p:nvPr/>
+      </p:nvGrpSpPr>
+      <p:grpSpPr>
+        <a:xfrm>
+          <a:off x="0" y="0"/>
+          <a:ext cx="0" cy="0"/>
+          <a:chOff x="0" y="0"/>
+          <a:chExt cx="0" cy="0"/>
+        </a:xfrm>
+      </p:grpSpPr>
+      <p:sp>
+        <p:nvSpPr>
+          <p:cNvPr id="2" name="Title 1"/>
+          <p:cNvSpPr>
+            <a:spLocks noGrp="1"/>
+          </p:cNvSpPr>
+          <p:nvPr>
+            <p:ph type="ctrTitle"/>
+          </p:nvPr>
+        </p:nvSpPr>
+        <p:spPr>
+          <a:xfrm>
+            <a:off x="683568" y="1340768"/>
+            <a:ext cx="7772400" cy="1470025"/>
+          </a:xfrm>
+        </p:spPr>
+        <p:txBody>
+          <a:bodyPr>
+            <a:normAutofit fontScale="90000"/>
+          </a:bodyPr>
+          <a:lstStyle/>
+          <a:p>
+            <a:r>
+              <a:rPr lang="pt-BR" dirty="0" smtClean="0"/>
+              <a:t>SDM </a:t>
+            </a:r>
+            <a:br>
+              <a:rPr lang="pt-BR" dirty="0" smtClean="0"/>
+            </a:br>
+            <a:r>
+              <a:rPr lang="pt-BR" dirty="0" smtClean="0"/>
+              <a:t> </a:t>
+            </a:r>
+            <a:r>
+              <a:rPr lang="en-US" dirty="0" smtClean="0"/>
+              <a:t> An Educational Game for Software Engineering</a:t>
+            </a:r>
+            <a:endParaRPr lang="pt-BR" dirty="0"/>
+          </a:p>
+        </p:txBody>
+      </p:sp>
+      <p:sp>
+        <p:nvSpPr>
+          <p:cNvPr id="3" name="Subtitle 2"/>
+          <p:cNvSpPr>
+            <a:spLocks noGrp="1"/>
+          </p:cNvSpPr>
+          <p:nvPr>
+            <p:ph type="subTitle" idx="1"/>
+          </p:nvPr>
+        </p:nvSpPr>
+        <p:spPr>
+          <a:xfrm>
+            <a:off x="1371600" y="3284984"/>
+            <a:ext cx="6400800" cy="2880320"/>
+          </a:xfrm>
+        </p:spPr>
+        <p:txBody>
+          <a:bodyPr>
+            <a:normAutofit fontScale="92500" lnSpcReduction="20000"/>
+          </a:bodyPr>
+          <a:lstStyle/>
+          <a:p>
+            <a:r>
+              <a:rPr lang="pt-BR" b="1" dirty="0" err="1" smtClean="0"/>
+              <a:t>Troy</a:t>
+            </a:r>
+            <a:r>
+              <a:rPr lang="pt-BR" b="1" dirty="0" smtClean="0"/>
+              <a:t> Costa </a:t>
+            </a:r>
+            <a:r>
+              <a:rPr lang="pt-BR" b="1" dirty="0" err="1" smtClean="0"/>
+              <a:t>Kohwalter</a:t>
+            </a:r>
+            <a:endParaRPr lang="pt-BR" b="1" dirty="0" smtClean="0"/>
+          </a:p>
+          <a:p>
+            <a:r>
+              <a:rPr lang="pt-BR" dirty="0" err="1" smtClean="0"/>
+              <a:t>Esteban</a:t>
+            </a:r>
+            <a:r>
+              <a:rPr lang="pt-BR" dirty="0" smtClean="0"/>
+              <a:t> W. Gonzalez </a:t>
+            </a:r>
+            <a:r>
+              <a:rPr lang="pt-BR" dirty="0" err="1" smtClean="0"/>
+              <a:t>Clua</a:t>
+            </a:r>
+            <a:endParaRPr lang="pt-BR" dirty="0" smtClean="0"/>
+          </a:p>
+          <a:p>
+            <a:r>
+              <a:rPr lang="pt-BR" dirty="0" smtClean="0"/>
+              <a:t>Leonardo G. Paulino Murta</a:t>
+            </a:r>
+          </a:p>
+          <a:p>
+            <a:endParaRPr lang="pt-BR" dirty="0" smtClean="0"/>
+          </a:p>
+          <a:p>
+            <a:r>
+              <a:rPr lang="pt-BR" dirty="0" smtClean="0"/>
+              <a:t>Game Access:</a:t>
+            </a:r>
+          </a:p>
+          <a:p>
+            <a:r>
+              <a:rPr lang="pt-BR" dirty="0" smtClean="0">
+                <a:hlinkClick r:id="rId2"/>
+              </a:rPr>
+              <a:t>http://www.ic.uff.br/~tkohwalter/sdm/</a:t>
+            </a:r>
+            <a:endParaRPr lang="pt-BR" dirty="0" smtClean="0"/>
+          </a:p>
+          <a:p>
+            <a:endParaRPr lang="pt-BR" dirty="0"/>
           </a:p>
         </p:txBody>
       </p:sp>
@@ -8794,8 +9628,13 @@
           <a:p>
             <a:r>
               <a:rPr lang="pt-BR" dirty="0" smtClean="0"/>
-              <a:t>SERIOUS GAME</a:t>
-            </a:r>
+              <a:t>SERIOUS </a:t>
+            </a:r>
+            <a:r>
+              <a:rPr lang="pt-BR" dirty="0" smtClean="0"/>
+              <a:t>GAME</a:t>
+            </a:r>
+            <a:endParaRPr lang="pt-BR" dirty="0" smtClean="0"/>
           </a:p>
           <a:p>
             <a:endParaRPr lang="pt-BR" dirty="0"/>
@@ -8906,7 +9745,145 @@
       </p:grpSpPr>
       <p:sp>
         <p:nvSpPr>
-          <p:cNvPr id="4" name="Espaço Reservado para Número de Slide 3"/>
+          <p:cNvPr id="2" name="Title 1"/>
+          <p:cNvSpPr>
+            <a:spLocks noGrp="1"/>
+          </p:cNvSpPr>
+          <p:nvPr>
+            <p:ph type="title"/>
+          </p:nvPr>
+        </p:nvSpPr>
+        <p:spPr/>
+        <p:txBody>
+          <a:bodyPr/>
+          <a:lstStyle/>
+          <a:p>
+            <a:r>
+              <a:rPr lang="pt-BR" dirty="0" smtClean="0"/>
+              <a:t>GAMEFICATION</a:t>
+            </a:r>
+            <a:endParaRPr lang="pt-BR" dirty="0"/>
+          </a:p>
+        </p:txBody>
+      </p:sp>
+      <p:sp>
+        <p:nvSpPr>
+          <p:cNvPr id="3" name="Content Placeholder 2"/>
+          <p:cNvSpPr>
+            <a:spLocks noGrp="1"/>
+          </p:cNvSpPr>
+          <p:nvPr>
+            <p:ph idx="1"/>
+          </p:nvPr>
+        </p:nvSpPr>
+        <p:spPr/>
+        <p:txBody>
+          <a:bodyPr>
+            <a:normAutofit fontScale="55000" lnSpcReduction="20000"/>
+          </a:bodyPr>
+          <a:lstStyle/>
+          <a:p>
+            <a:r>
+              <a:rPr lang="pt-BR" dirty="0" smtClean="0"/>
+              <a:t>COUNTDOWN</a:t>
+            </a:r>
+          </a:p>
+          <a:p>
+            <a:pPr lvl="1"/>
+            <a:r>
+              <a:rPr lang="pt-BR" dirty="0" smtClean="0"/>
+              <a:t>PROJECT DEADLINE</a:t>
+            </a:r>
+          </a:p>
+          <a:p>
+            <a:endParaRPr lang="pt-BR" dirty="0" smtClean="0"/>
+          </a:p>
+          <a:p>
+            <a:r>
+              <a:rPr lang="pt-BR" dirty="0" smtClean="0"/>
+              <a:t>INFINITE GAMEPLAY</a:t>
+            </a:r>
+          </a:p>
+          <a:p>
+            <a:pPr lvl="1"/>
+            <a:r>
+              <a:rPr lang="pt-BR" dirty="0" smtClean="0"/>
+              <a:t>RANDOM PROJECT GENERATION</a:t>
+            </a:r>
+          </a:p>
+          <a:p>
+            <a:endParaRPr lang="pt-BR" dirty="0" smtClean="0"/>
+          </a:p>
+          <a:p>
+            <a:r>
+              <a:rPr lang="pt-BR" dirty="0" smtClean="0"/>
+              <a:t>LEVEL</a:t>
+            </a:r>
+          </a:p>
+          <a:p>
+            <a:pPr lvl="1"/>
+            <a:r>
+              <a:rPr lang="pt-BR" dirty="0" smtClean="0"/>
+              <a:t>EMPLOYEE AND COMPANY EARN EXPERIENCE POINTS</a:t>
+            </a:r>
+          </a:p>
+          <a:p>
+            <a:endParaRPr lang="pt-BR" dirty="0" smtClean="0"/>
+          </a:p>
+          <a:p>
+            <a:r>
+              <a:rPr lang="pt-BR" dirty="0" smtClean="0"/>
+              <a:t>LOSS AVERGION</a:t>
+            </a:r>
+          </a:p>
+          <a:p>
+            <a:pPr lvl="1"/>
+            <a:r>
+              <a:rPr lang="pt-BR" dirty="0" err="1" smtClean="0"/>
+              <a:t>COMPANY’S</a:t>
+            </a:r>
+            <a:r>
+              <a:rPr lang="pt-BR" dirty="0" smtClean="0"/>
+              <a:t> EXPERIENCE POINT LOSS ON FAILURE</a:t>
+            </a:r>
+          </a:p>
+          <a:p>
+            <a:endParaRPr lang="pt-BR" dirty="0" smtClean="0"/>
+          </a:p>
+          <a:p>
+            <a:r>
+              <a:rPr lang="pt-BR" dirty="0" smtClean="0"/>
+              <a:t>PROGRESSION</a:t>
+            </a:r>
+          </a:p>
+          <a:p>
+            <a:pPr lvl="1"/>
+            <a:r>
+              <a:rPr lang="pt-BR" dirty="0" smtClean="0"/>
+              <a:t>EXPERIENCE BAR</a:t>
+            </a:r>
+          </a:p>
+          <a:p>
+            <a:endParaRPr lang="pt-BR" dirty="0" smtClean="0"/>
+          </a:p>
+          <a:p>
+            <a:r>
+              <a:rPr lang="pt-BR" dirty="0" smtClean="0"/>
+              <a:t>REWARD SCHEDULES</a:t>
+            </a:r>
+          </a:p>
+          <a:p>
+            <a:pPr lvl="1"/>
+            <a:r>
+              <a:rPr lang="pt-BR" dirty="0" smtClean="0"/>
+              <a:t>MONTHLY PAYMENT WHILE ON SCHEDULE</a:t>
+            </a:r>
+          </a:p>
+        </p:txBody>
+      </p:sp>
+      <p:sp>
+        <p:nvSpPr>
+          <p:cNvPr id="4" name="Slide Number Placeholder 3"/>
           <p:cNvSpPr>
             <a:spLocks noGrp="1"/>
           </p:cNvSpPr>
@@ -8924,77 +9901,15 @@
               <a:pPr/>
               <a:t>5</a:t>
             </a:fld>
-            <a:endParaRPr lang="pt-BR" dirty="0"/>
-          </a:p>
-        </p:txBody>
-      </p:sp>
-      <p:sp>
-        <p:nvSpPr>
-          <p:cNvPr id="2" name="Title 1"/>
-          <p:cNvSpPr>
-            <a:spLocks noGrp="1"/>
-          </p:cNvSpPr>
-          <p:nvPr>
-            <p:ph type="title"/>
-          </p:nvPr>
-        </p:nvSpPr>
-        <p:spPr/>
-        <p:txBody>
-          <a:bodyPr/>
-          <a:lstStyle/>
-          <a:p>
-            <a:r>
-              <a:rPr lang="pt-BR" dirty="0" smtClean="0"/>
-              <a:t>SDM</a:t>
-            </a:r>
-            <a:endParaRPr lang="pt-BR" dirty="0"/>
-          </a:p>
-        </p:txBody>
-      </p:sp>
-      <p:pic>
-        <p:nvPicPr>
-          <p:cNvPr id="3075" name="Picture 3"/>
-          <p:cNvPicPr>
-            <a:picLocks noChangeAspect="1" noChangeArrowheads="1"/>
-          </p:cNvPicPr>
-          <p:nvPr/>
-        </p:nvPicPr>
-        <p:blipFill>
-          <a:blip r:embed="rId3" cstate="print"/>
-          <a:srcRect/>
-          <a:stretch>
-            <a:fillRect/>
-          </a:stretch>
-        </p:blipFill>
-        <p:spPr bwMode="auto">
-          <a:xfrm>
-            <a:off x="0" y="-22023"/>
-            <a:ext cx="9144000" cy="6880023"/>
-          </a:xfrm>
-          <a:prstGeom prst="rect">
-            <a:avLst/>
-          </a:prstGeom>
-          <a:noFill/>
-          <a:ln w="9525">
-            <a:noFill/>
-            <a:miter lim="800000"/>
-            <a:headEnd/>
-            <a:tailEnd/>
-          </a:ln>
-        </p:spPr>
-      </p:pic>
+            <a:endParaRPr lang="pt-BR"/>
+          </a:p>
+        </p:txBody>
+      </p:sp>
     </p:spTree>
   </p:cSld>
   <p:clrMapOvr>
     <a:masterClrMapping/>
   </p:clrMapOvr>
-  <p:timing>
-    <p:tnLst>
-      <p:par>
-        <p:cTn id="1" dur="indefinite" restart="never" nodeType="tmRoot"/>
-      </p:par>
-    </p:tnLst>
-  </p:timing>
 </p:sld>
 </file>
 
@@ -9027,16 +9942,10 @@
         </p:nvSpPr>
         <p:spPr/>
         <p:txBody>
-          <a:bodyPr>
-            <a:normAutofit/>
-          </a:bodyPr>
-          <a:lstStyle/>
-          <a:p>
-            <a:r>
-              <a:rPr lang="pt-BR" dirty="0" smtClean="0"/>
-              <a:t>SDM</a:t>
-            </a:r>
-            <a:endParaRPr lang="pt-BR" dirty="0"/>
+          <a:bodyPr/>
+          <a:lstStyle/>
+          <a:p>
+            <a:endParaRPr lang="pt-BR"/>
           </a:p>
         </p:txBody>
       </p:sp>
@@ -9052,97 +9961,16 @@
         </p:nvSpPr>
         <p:spPr/>
         <p:txBody>
-          <a:bodyPr>
-            <a:normAutofit fontScale="70000" lnSpcReduction="20000"/>
-          </a:bodyPr>
-          <a:lstStyle/>
-          <a:p>
-            <a:r>
-              <a:rPr lang="pt-BR" dirty="0" smtClean="0"/>
-              <a:t>EMPLOYEES</a:t>
-            </a:r>
-          </a:p>
-          <a:p>
-            <a:endParaRPr lang="pt-BR" dirty="0" smtClean="0"/>
-          </a:p>
-          <a:p>
-            <a:pPr lvl="1"/>
-            <a:r>
-              <a:rPr lang="pt-BR" dirty="0" smtClean="0"/>
-              <a:t>ROLES</a:t>
-            </a:r>
-          </a:p>
-          <a:p>
-            <a:pPr lvl="1"/>
-            <a:endParaRPr lang="pt-BR" dirty="0" smtClean="0"/>
-          </a:p>
-          <a:p>
-            <a:pPr lvl="2"/>
-            <a:r>
-              <a:rPr lang="pt-BR" dirty="0" smtClean="0"/>
-              <a:t>ANALYST</a:t>
-            </a:r>
-          </a:p>
-          <a:p>
-            <a:pPr lvl="2"/>
-            <a:endParaRPr lang="pt-BR" dirty="0" smtClean="0"/>
-          </a:p>
-          <a:p>
-            <a:pPr lvl="2"/>
-            <a:r>
-              <a:rPr lang="pt-BR" dirty="0" smtClean="0"/>
-              <a:t>ARCHITECT</a:t>
-            </a:r>
-          </a:p>
-          <a:p>
-            <a:pPr lvl="2"/>
-            <a:endParaRPr lang="pt-BR" dirty="0" smtClean="0"/>
-          </a:p>
-          <a:p>
-            <a:pPr lvl="2"/>
-            <a:r>
-              <a:rPr lang="pt-BR" dirty="0" smtClean="0"/>
-              <a:t>MANAGER</a:t>
-            </a:r>
-          </a:p>
-          <a:p>
-            <a:pPr lvl="2"/>
-            <a:endParaRPr lang="pt-BR" dirty="0" smtClean="0"/>
-          </a:p>
-          <a:p>
-            <a:pPr lvl="2"/>
-            <a:r>
-              <a:rPr lang="pt-BR" dirty="0" smtClean="0"/>
-              <a:t>MARKETING</a:t>
-            </a:r>
-          </a:p>
-          <a:p>
-            <a:pPr lvl="2"/>
-            <a:endParaRPr lang="pt-BR" dirty="0" smtClean="0"/>
-          </a:p>
-          <a:p>
-            <a:pPr lvl="2"/>
-            <a:r>
-              <a:rPr lang="pt-BR" dirty="0" smtClean="0"/>
-              <a:t>PROGRAMMER</a:t>
-            </a:r>
-          </a:p>
-          <a:p>
-            <a:pPr lvl="2"/>
-            <a:endParaRPr lang="pt-BR" dirty="0" smtClean="0"/>
-          </a:p>
-          <a:p>
-            <a:pPr lvl="2"/>
-            <a:r>
-              <a:rPr lang="pt-BR" dirty="0" smtClean="0"/>
-              <a:t>TESTER</a:t>
-            </a:r>
-          </a:p>
-        </p:txBody>
-      </p:sp>
-      <p:sp>
-        <p:nvSpPr>
-          <p:cNvPr id="5" name="Espaço Reservado para Número de Slide 4"/>
+          <a:bodyPr/>
+          <a:lstStyle/>
+          <a:p>
+            <a:endParaRPr lang="pt-BR"/>
+          </a:p>
+        </p:txBody>
+      </p:sp>
+      <p:sp>
+        <p:nvSpPr>
+          <p:cNvPr id="4" name="Slide Number Placeholder 3"/>
           <p:cNvSpPr>
             <a:spLocks noGrp="1"/>
           </p:cNvSpPr>
@@ -9166,14 +9994,14 @@
       </p:sp>
       <p:pic>
         <p:nvPicPr>
-          <p:cNvPr id="4099" name="Picture 3"/>
+          <p:cNvPr id="3074" name="Picture 2"/>
           <p:cNvPicPr>
             <a:picLocks noChangeAspect="1" noChangeArrowheads="1"/>
           </p:cNvPicPr>
           <p:nvPr/>
         </p:nvPicPr>
         <p:blipFill>
-          <a:blip r:embed="rId3" cstate="print"/>
+          <a:blip r:embed="rId2" cstate="print"/>
           <a:srcRect/>
           <a:stretch>
             <a:fillRect/>
@@ -9181,8 +10009,8 @@
         </p:blipFill>
         <p:spPr bwMode="auto">
           <a:xfrm>
-            <a:off x="3851920" y="2276872"/>
-            <a:ext cx="4738010" cy="2952328"/>
+            <a:off x="44132" y="0"/>
+            <a:ext cx="9099868" cy="6858000"/>
           </a:xfrm>
           <a:prstGeom prst="rect">
             <a:avLst/>
@@ -9240,29 +10068,6 @@
         </p:nvSpPr>
         <p:spPr/>
         <p:txBody>
-          <a:bodyPr/>
-          <a:lstStyle/>
-          <a:p>
-            <a:r>
-              <a:rPr lang="pt-BR" dirty="0" smtClean="0"/>
-              <a:t>SDM</a:t>
-            </a:r>
-            <a:endParaRPr lang="pt-BR" dirty="0"/>
-          </a:p>
-        </p:txBody>
-      </p:sp>
-      <p:sp>
-        <p:nvSpPr>
-          <p:cNvPr id="3" name="Content Placeholder 2"/>
-          <p:cNvSpPr>
-            <a:spLocks noGrp="1"/>
-          </p:cNvSpPr>
-          <p:nvPr>
-            <p:ph idx="1"/>
-          </p:nvPr>
-        </p:nvSpPr>
-        <p:spPr/>
-        <p:txBody>
           <a:bodyPr>
             <a:normAutofit/>
           </a:bodyPr>
@@ -9270,6 +10075,31 @@
           <a:p>
             <a:r>
               <a:rPr lang="pt-BR" dirty="0" smtClean="0"/>
+              <a:t>SDM</a:t>
+            </a:r>
+            <a:endParaRPr lang="pt-BR" dirty="0"/>
+          </a:p>
+        </p:txBody>
+      </p:sp>
+      <p:sp>
+        <p:nvSpPr>
+          <p:cNvPr id="3" name="Content Placeholder 2"/>
+          <p:cNvSpPr>
+            <a:spLocks noGrp="1"/>
+          </p:cNvSpPr>
+          <p:nvPr>
+            <p:ph idx="1"/>
+          </p:nvPr>
+        </p:nvSpPr>
+        <p:spPr/>
+        <p:txBody>
+          <a:bodyPr>
+            <a:normAutofit fontScale="70000" lnSpcReduction="20000"/>
+          </a:bodyPr>
+          <a:lstStyle/>
+          <a:p>
+            <a:r>
+              <a:rPr lang="pt-BR" dirty="0" smtClean="0"/>
               <a:t>EMPLOYEES</a:t>
             </a:r>
           </a:p>
@@ -9279,10 +10109,9 @@
           <a:p>
             <a:pPr lvl="1"/>
             <a:r>
-              <a:rPr lang="pt-BR" smtClean="0"/>
-              <a:t>GRADES</a:t>
-            </a:r>
-            <a:endParaRPr lang="pt-BR" dirty="0" smtClean="0"/>
+              <a:rPr lang="pt-BR" dirty="0" smtClean="0"/>
+              <a:t>ROLES</a:t>
+            </a:r>
           </a:p>
           <a:p>
             <a:pPr lvl="1"/>
@@ -9292,7 +10121,7 @@
             <a:pPr lvl="2"/>
             <a:r>
               <a:rPr lang="pt-BR" dirty="0" smtClean="0"/>
-              <a:t>JUNIOR</a:t>
+              <a:t>ANALYST</a:t>
             </a:r>
           </a:p>
           <a:p>
@@ -9303,7 +10132,7 @@
             <a:pPr lvl="2"/>
             <a:r>
               <a:rPr lang="pt-BR" dirty="0" smtClean="0"/>
-              <a:t>MID-LEVEL</a:t>
+              <a:t>ARCHITECT</a:t>
             </a:r>
           </a:p>
           <a:p>
@@ -9314,23 +10143,47 @@
             <a:pPr lvl="2"/>
             <a:r>
               <a:rPr lang="pt-BR" dirty="0" smtClean="0"/>
-              <a:t>SENIOR</a:t>
-            </a:r>
-          </a:p>
-          <a:p>
-            <a:pPr>
-              <a:buNone/>
-            </a:pPr>
+              <a:t>MANAGER</a:t>
+            </a:r>
+          </a:p>
+          <a:p>
+            <a:pPr lvl="2"/>
             <a:endParaRPr lang="pt-BR" dirty="0" smtClean="0"/>
           </a:p>
           <a:p>
-            <a:endParaRPr lang="pt-BR" dirty="0"/>
-          </a:p>
-        </p:txBody>
-      </p:sp>
-      <p:sp>
-        <p:nvSpPr>
-          <p:cNvPr id="6" name="Espaço Reservado para Número de Slide 5"/>
+            <a:pPr lvl="2"/>
+            <a:r>
+              <a:rPr lang="pt-BR" dirty="0" smtClean="0"/>
+              <a:t>MARKETING</a:t>
+            </a:r>
+          </a:p>
+          <a:p>
+            <a:pPr lvl="2"/>
+            <a:endParaRPr lang="pt-BR" dirty="0" smtClean="0"/>
+          </a:p>
+          <a:p>
+            <a:pPr lvl="2"/>
+            <a:r>
+              <a:rPr lang="pt-BR" dirty="0" smtClean="0"/>
+              <a:t>PROGRAMMER</a:t>
+            </a:r>
+          </a:p>
+          <a:p>
+            <a:pPr lvl="2"/>
+            <a:endParaRPr lang="pt-BR" dirty="0" smtClean="0"/>
+          </a:p>
+          <a:p>
+            <a:pPr lvl="2"/>
+            <a:r>
+              <a:rPr lang="pt-BR" dirty="0" smtClean="0"/>
+              <a:t>TESTER</a:t>
+            </a:r>
+          </a:p>
+        </p:txBody>
+      </p:sp>
+      <p:sp>
+        <p:nvSpPr>
+          <p:cNvPr id="5" name="Espaço Reservado para Número de Slide 4"/>
           <p:cNvSpPr>
             <a:spLocks noGrp="1"/>
           </p:cNvSpPr>
@@ -9354,7 +10207,7 @@
       </p:sp>
       <p:pic>
         <p:nvPicPr>
-          <p:cNvPr id="7" name="Picture 3"/>
+          <p:cNvPr id="4099" name="Picture 3"/>
           <p:cNvPicPr>
             <a:picLocks noChangeAspect="1" noChangeArrowheads="1"/>
           </p:cNvPicPr>
@@ -9516,8 +10369,9 @@
             <a:pPr lvl="2"/>
             <a:r>
               <a:rPr lang="pt-BR" dirty="0" smtClean="0"/>
-              <a:t>PERFORMAMCE</a:t>
-            </a:r>
+              <a:t>PERFORMANCE</a:t>
+            </a:r>
+            <a:endParaRPr lang="pt-BR" dirty="0" smtClean="0"/>
           </a:p>
           <a:p>
             <a:pPr lvl="3"/>
@@ -9750,8 +10604,8 @@
         </p:blipFill>
         <p:spPr bwMode="auto">
           <a:xfrm>
-            <a:off x="6876256" y="1484784"/>
-            <a:ext cx="1905000" cy="2667000"/>
+            <a:off x="7020272" y="3284984"/>
+            <a:ext cx="1616968" cy="2263755"/>
           </a:xfrm>
           <a:prstGeom prst="rect">
             <a:avLst/>
@@ -9782,7 +10636,7 @@
         </p:blipFill>
         <p:spPr bwMode="auto">
           <a:xfrm>
-            <a:off x="3995936" y="1340768"/>
+            <a:off x="3779912" y="1412776"/>
             <a:ext cx="2742835" cy="2880320"/>
           </a:xfrm>
           <a:prstGeom prst="rect">
@@ -9814,8 +10668,8 @@
         </p:blipFill>
         <p:spPr bwMode="auto">
           <a:xfrm>
-            <a:off x="4860032" y="4437112"/>
-            <a:ext cx="2838450" cy="2085975"/>
+            <a:off x="6516216" y="1412776"/>
+            <a:ext cx="2478410" cy="1821382"/>
           </a:xfrm>
           <a:prstGeom prst="rect">
             <a:avLst/>

</xml_diff>